<commit_message>
Updated presentation, and updated cost/timeline/risk sheet
</commit_message>
<xml_diff>
--- a/Project Documents/Rotary Kiln Data Acquisition and Controls Upgrade.pptx
+++ b/Project Documents/Rotary Kiln Data Acquisition and Controls Upgrade.pptx
@@ -10,6 +10,9 @@
     <p:sldId id="257" r:id="rId4"/>
     <p:sldId id="258" r:id="rId5"/>
     <p:sldId id="260" r:id="rId6"/>
+    <p:sldId id="261" r:id="rId7"/>
+    <p:sldId id="263" r:id="rId8"/>
+    <p:sldId id="262" r:id="rId9"/>
   </p:sldIdLst>
   <p:sldSz cx="9144000" cy="6858000" type="screen4x3"/>
   <p:notesSz cx="6858000" cy="9144000"/>
@@ -520,7 +523,7 @@
           <a:p>
             <a:fld id="{83842AD0-6CE8-481A-BEF2-1943706ACD4F}" type="datetimeFigureOut">
               <a:rPr lang="en-US" smtClean="0"/>
-              <a:t>9/3/2015</a:t>
+              <a:t>9/8/2015</a:t>
             </a:fld>
             <a:endParaRPr lang="en-US"/>
           </a:p>
@@ -854,7 +857,7 @@
           <a:p>
             <a:fld id="{83842AD0-6CE8-481A-BEF2-1943706ACD4F}" type="datetimeFigureOut">
               <a:rPr lang="en-US" smtClean="0"/>
-              <a:t>9/3/2015</a:t>
+              <a:t>9/8/2015</a:t>
             </a:fld>
             <a:endParaRPr lang="en-US"/>
           </a:p>
@@ -1244,7 +1247,7 @@
           <a:p>
             <a:fld id="{83842AD0-6CE8-481A-BEF2-1943706ACD4F}" type="datetimeFigureOut">
               <a:rPr lang="en-US" smtClean="0"/>
-              <a:t>9/3/2015</a:t>
+              <a:t>9/8/2015</a:t>
             </a:fld>
             <a:endParaRPr lang="en-US"/>
           </a:p>
@@ -1680,7 +1683,7 @@
           <a:p>
             <a:fld id="{83842AD0-6CE8-481A-BEF2-1943706ACD4F}" type="datetimeFigureOut">
               <a:rPr lang="en-US" smtClean="0"/>
-              <a:t>9/3/2015</a:t>
+              <a:t>9/8/2015</a:t>
             </a:fld>
             <a:endParaRPr lang="en-US"/>
           </a:p>
@@ -2113,7 +2116,7 @@
           <a:p>
             <a:fld id="{83842AD0-6CE8-481A-BEF2-1943706ACD4F}" type="datetimeFigureOut">
               <a:rPr lang="en-US" smtClean="0"/>
-              <a:t>9/3/2015</a:t>
+              <a:t>9/8/2015</a:t>
             </a:fld>
             <a:endParaRPr lang="en-US"/>
           </a:p>
@@ -2597,7 +2600,7 @@
           <a:p>
             <a:fld id="{83842AD0-6CE8-481A-BEF2-1943706ACD4F}" type="datetimeFigureOut">
               <a:rPr lang="en-US" smtClean="0"/>
-              <a:t>9/3/2015</a:t>
+              <a:t>9/8/2015</a:t>
             </a:fld>
             <a:endParaRPr lang="en-US"/>
           </a:p>
@@ -3183,7 +3186,7 @@
           <a:p>
             <a:fld id="{83842AD0-6CE8-481A-BEF2-1943706ACD4F}" type="datetimeFigureOut">
               <a:rPr lang="en-US" smtClean="0"/>
-              <a:t>9/3/2015</a:t>
+              <a:t>9/8/2015</a:t>
             </a:fld>
             <a:endParaRPr lang="en-US"/>
           </a:p>
@@ -3511,7 +3514,7 @@
           <a:p>
             <a:fld id="{83842AD0-6CE8-481A-BEF2-1943706ACD4F}" type="datetimeFigureOut">
               <a:rPr lang="en-US" smtClean="0"/>
-              <a:t>9/3/2015</a:t>
+              <a:t>9/8/2015</a:t>
             </a:fld>
             <a:endParaRPr lang="en-US"/>
           </a:p>
@@ -3760,7 +3763,7 @@
           <a:p>
             <a:fld id="{83842AD0-6CE8-481A-BEF2-1943706ACD4F}" type="datetimeFigureOut">
               <a:rPr lang="en-US" smtClean="0"/>
-              <a:t>9/3/2015</a:t>
+              <a:t>9/8/2015</a:t>
             </a:fld>
             <a:endParaRPr lang="en-US"/>
           </a:p>
@@ -3924,7 +3927,6 @@
               <a:rPr lang="en-US" smtClean="0"/>
               <a:t>Click to edit Master title style</a:t>
             </a:r>
-            <a:endParaRPr lang="en-US" smtClean="0"/>
           </a:p>
         </p:txBody>
       </p:sp>
@@ -4264,7 +4266,7 @@
           <a:p>
             <a:fld id="{83842AD0-6CE8-481A-BEF2-1943706ACD4F}" type="datetimeFigureOut">
               <a:rPr lang="en-US" smtClean="0"/>
-              <a:t>9/3/2015</a:t>
+              <a:t>9/8/2015</a:t>
             </a:fld>
             <a:endParaRPr lang="en-US"/>
           </a:p>
@@ -4715,7 +4717,7 @@
           <a:p>
             <a:fld id="{83842AD0-6CE8-481A-BEF2-1943706ACD4F}" type="datetimeFigureOut">
               <a:rPr lang="en-US" smtClean="0"/>
-              <a:t>9/3/2015</a:t>
+              <a:t>9/8/2015</a:t>
             </a:fld>
             <a:endParaRPr lang="en-US"/>
           </a:p>
@@ -5117,7 +5119,7 @@
           <a:p>
             <a:fld id="{83842AD0-6CE8-481A-BEF2-1943706ACD4F}" type="datetimeFigureOut">
               <a:rPr lang="en-US" smtClean="0"/>
-              <a:t>9/3/2015</a:t>
+              <a:t>9/8/2015</a:t>
             </a:fld>
             <a:endParaRPr lang="en-US"/>
           </a:p>
@@ -5649,35 +5651,13 @@
         <p:spPr/>
         <p:txBody>
           <a:bodyPr>
-            <a:normAutofit fontScale="92500" lnSpcReduction="20000"/>
+            <a:normAutofit/>
           </a:bodyPr>
           <a:lstStyle/>
           <a:p>
             <a:r>
               <a:rPr lang="en-US" dirty="0" smtClean="0"/>
-              <a:t>Bringing Zircoa into the 20</a:t>
-            </a:r>
-            <a:r>
-              <a:rPr lang="en-US" baseline="30000" dirty="0" smtClean="0"/>
-              <a:t>th</a:t>
-            </a:r>
-            <a:r>
-              <a:rPr lang="en-US" dirty="0" smtClean="0"/>
-              <a:t> Century.</a:t>
-            </a:r>
-          </a:p>
-          <a:p>
-            <a:r>
-              <a:rPr lang="en-US" dirty="0" smtClean="0"/>
-              <a:t>…Just not the 21</a:t>
-            </a:r>
-            <a:r>
-              <a:rPr lang="en-US" baseline="30000" dirty="0" smtClean="0"/>
-              <a:t>st</a:t>
-            </a:r>
-            <a:r>
-              <a:rPr lang="en-US" dirty="0" smtClean="0"/>
-              <a:t> Century</a:t>
+              <a:t>Capital Project Proposal Presentation</a:t>
             </a:r>
             <a:endParaRPr lang="en-US" dirty="0"/>
           </a:p>
@@ -6695,11 +6675,11 @@
   <p:clrMapOvr>
     <a:masterClrMapping/>
   </p:clrMapOvr>
-  <mc:AlternateContent xmlns:mc="http://schemas.openxmlformats.org/markup-compatibility/2006">
-    <mc:Choice xmlns:p14="http://schemas.microsoft.com/office/powerpoint/2010/main" Requires="p14">
+  <mc:AlternateContent xmlns:mc="http://schemas.openxmlformats.org/markup-compatibility/2006" xmlns:p14="http://schemas.microsoft.com/office/powerpoint/2010/main">
+    <mc:Choice Requires="p14">
       <p:transition p14:dur="0"/>
     </mc:Choice>
-    <mc:Fallback>
+    <mc:Fallback xmlns="">
       <p:transition/>
     </mc:Fallback>
   </mc:AlternateContent>
@@ -7044,7 +7024,11 @@
           <a:bodyPr/>
           <a:lstStyle/>
           <a:p>
-            <a:endParaRPr lang="en-US"/>
+            <a:r>
+              <a:rPr lang="en-US" dirty="0" smtClean="0"/>
+              <a:t>Project Timeline</a:t>
+            </a:r>
+            <a:endParaRPr lang="en-US" dirty="0"/>
           </a:p>
         </p:txBody>
       </p:sp>
@@ -7063,7 +7047,65 @@
           <a:bodyPr/>
           <a:lstStyle/>
           <a:p>
-            <a:endParaRPr lang="en-US"/>
+            <a:r>
+              <a:rPr lang="en-US" dirty="0" smtClean="0"/>
+              <a:t>Project Submission/Approval: 1 week</a:t>
+            </a:r>
+          </a:p>
+          <a:p>
+            <a:r>
+              <a:rPr lang="en-US" dirty="0" smtClean="0"/>
+              <a:t>Capital Lead Time and </a:t>
+            </a:r>
+            <a:r>
+              <a:rPr lang="en-US" dirty="0" err="1" smtClean="0"/>
+              <a:t>Dusthouse</a:t>
+            </a:r>
+            <a:r>
+              <a:rPr lang="en-US" dirty="0" smtClean="0"/>
+              <a:t> Install: 9.5 weeks ( 5 week lead time on controller)</a:t>
+            </a:r>
+          </a:p>
+          <a:p>
+            <a:r>
+              <a:rPr lang="en-US" dirty="0" smtClean="0"/>
+              <a:t>Dust House Pressure Control Testing: 5.5 weeks</a:t>
+            </a:r>
+          </a:p>
+          <a:p>
+            <a:r>
+              <a:rPr lang="en-US" dirty="0" smtClean="0"/>
+              <a:t>Complete Installation (Dryer system): 1.5 weeks</a:t>
+            </a:r>
+          </a:p>
+          <a:p>
+            <a:r>
+              <a:rPr lang="en-US" dirty="0" smtClean="0"/>
+              <a:t>Dryer System Control Testing: 6 weeks</a:t>
+            </a:r>
+          </a:p>
+          <a:p>
+            <a:endParaRPr lang="en-US" dirty="0"/>
+          </a:p>
+          <a:p>
+            <a:r>
+              <a:rPr lang="en-US" b="1" dirty="0" smtClean="0"/>
+              <a:t>Total: 23.5 weeks</a:t>
+            </a:r>
+            <a:endParaRPr lang="en-US" dirty="0" smtClean="0"/>
+          </a:p>
+          <a:p>
+            <a:r>
+              <a:rPr lang="en-US" dirty="0"/>
+              <a:t>See layout: </a:t>
+            </a:r>
+            <a:r>
+              <a:rPr lang="en-US" dirty="0">
+                <a:hlinkClick r:id="rId2"/>
+              </a:rPr>
+              <a:t>https://app.smartsheet.com/b/home?lx=N4OUXAf6B3I8L6I0yzplWg</a:t>
+            </a:r>
+            <a:endParaRPr lang="en-US" dirty="0"/>
           </a:p>
         </p:txBody>
       </p:sp>
@@ -7071,6 +7113,2493 @@
     <p:extLst>
       <p:ext uri="{BB962C8B-B14F-4D97-AF65-F5344CB8AC3E}">
         <p14:creationId xmlns:p14="http://schemas.microsoft.com/office/powerpoint/2010/main" val="3013619922"/>
+      </p:ext>
+    </p:extLst>
+  </p:cSld>
+  <p:clrMapOvr>
+    <a:masterClrMapping/>
+  </p:clrMapOvr>
+  <p:timing>
+    <p:tnLst>
+      <p:par>
+        <p:cTn id="1" dur="indefinite" restart="never" nodeType="tmRoot"/>
+      </p:par>
+    </p:tnLst>
+  </p:timing>
+</p:sld>
+</file>
+
+<file path=ppt/slides/slide6.xml><?xml version="1.0" encoding="utf-8"?>
+<p:sld xmlns:a="http://schemas.openxmlformats.org/drawingml/2006/main" xmlns:r="http://schemas.openxmlformats.org/officeDocument/2006/relationships" xmlns:p="http://schemas.openxmlformats.org/presentationml/2006/main">
+  <p:cSld>
+    <p:spTree>
+      <p:nvGrpSpPr>
+        <p:cNvPr id="1" name=""/>
+        <p:cNvGrpSpPr/>
+        <p:nvPr/>
+      </p:nvGrpSpPr>
+      <p:grpSpPr>
+        <a:xfrm>
+          <a:off x="0" y="0"/>
+          <a:ext cx="0" cy="0"/>
+          <a:chOff x="0" y="0"/>
+          <a:chExt cx="0" cy="0"/>
+        </a:xfrm>
+      </p:grpSpPr>
+      <p:sp>
+        <p:nvSpPr>
+          <p:cNvPr id="2" name="Title 1"/>
+          <p:cNvSpPr>
+            <a:spLocks noGrp="1"/>
+          </p:cNvSpPr>
+          <p:nvPr>
+            <p:ph type="title"/>
+          </p:nvPr>
+        </p:nvSpPr>
+        <p:spPr/>
+        <p:txBody>
+          <a:bodyPr>
+            <a:normAutofit/>
+          </a:bodyPr>
+          <a:lstStyle/>
+          <a:p>
+            <a:r>
+              <a:rPr lang="en-US" dirty="0" smtClean="0"/>
+              <a:t>Project Costs</a:t>
+            </a:r>
+            <a:endParaRPr lang="en-US" dirty="0"/>
+          </a:p>
+        </p:txBody>
+      </p:sp>
+      <p:graphicFrame>
+        <p:nvGraphicFramePr>
+          <p:cNvPr id="7" name="Content Placeholder 6"/>
+          <p:cNvGraphicFramePr>
+            <a:graphicFrameLocks noGrp="1"/>
+          </p:cNvGraphicFramePr>
+          <p:nvPr>
+            <p:ph idx="1"/>
+            <p:extLst>
+              <p:ext uri="{D42A27DB-BD31-4B8C-83A1-F6EECF244321}">
+                <p14:modId xmlns:p14="http://schemas.microsoft.com/office/powerpoint/2010/main" val="2856243462"/>
+              </p:ext>
+            </p:extLst>
+          </p:nvPr>
+        </p:nvGraphicFramePr>
+        <p:xfrm>
+          <a:off x="2209800" y="2590800"/>
+          <a:ext cx="4724400" cy="3093720"/>
+        </p:xfrm>
+        <a:graphic>
+          <a:graphicData uri="http://schemas.openxmlformats.org/drawingml/2006/table">
+            <a:tbl>
+              <a:tblPr/>
+              <a:tblGrid>
+                <a:gridCol w="3639370"/>
+                <a:gridCol w="1085030"/>
+              </a:tblGrid>
+              <a:tr h="207746">
+                <a:tc>
+                  <a:txBody>
+                    <a:bodyPr/>
+                    <a:lstStyle/>
+                    <a:p>
+                      <a:pPr algn="l" fontAlgn="b"/>
+                      <a:r>
+                        <a:rPr lang="en-US" sz="1400" b="0" i="0" u="none" strike="noStrike" dirty="0">
+                          <a:solidFill>
+                            <a:srgbClr val="000000"/>
+                          </a:solidFill>
+                          <a:effectLst/>
+                          <a:latin typeface="Calibri"/>
+                        </a:rPr>
+                        <a:t>HC 900 controller</a:t>
+                      </a:r>
+                    </a:p>
+                  </a:txBody>
+                  <a:tcPr marL="7620" marR="7620" marT="7620" marB="0" anchor="b">
+                    <a:lnL w="12700" cap="flat" cmpd="sng" algn="ctr">
+                      <a:solidFill>
+                        <a:srgbClr val="000000"/>
+                      </a:solidFill>
+                      <a:prstDash val="solid"/>
+                      <a:round/>
+                      <a:headEnd type="none" w="med" len="med"/>
+                      <a:tailEnd type="none" w="med" len="med"/>
+                    </a:lnL>
+                    <a:lnR w="6350" cap="flat" cmpd="sng" algn="ctr">
+                      <a:solidFill>
+                        <a:srgbClr val="000000"/>
+                      </a:solidFill>
+                      <a:prstDash val="solid"/>
+                      <a:round/>
+                      <a:headEnd type="none" w="med" len="med"/>
+                      <a:tailEnd type="none" w="med" len="med"/>
+                    </a:lnR>
+                    <a:lnT w="12700" cap="flat" cmpd="sng" algn="ctr">
+                      <a:solidFill>
+                        <a:srgbClr val="000000"/>
+                      </a:solidFill>
+                      <a:prstDash val="solid"/>
+                      <a:round/>
+                      <a:headEnd type="none" w="med" len="med"/>
+                      <a:tailEnd type="none" w="med" len="med"/>
+                    </a:lnT>
+                    <a:lnB w="6350" cap="flat" cmpd="sng" algn="ctr">
+                      <a:solidFill>
+                        <a:srgbClr val="000000"/>
+                      </a:solidFill>
+                      <a:prstDash val="solid"/>
+                      <a:round/>
+                      <a:headEnd type="none" w="med" len="med"/>
+                      <a:tailEnd type="none" w="med" len="med"/>
+                    </a:lnB>
+                  </a:tcPr>
+                </a:tc>
+                <a:tc>
+                  <a:txBody>
+                    <a:bodyPr/>
+                    <a:lstStyle/>
+                    <a:p>
+                      <a:pPr algn="r" fontAlgn="b"/>
+                      <a:r>
+                        <a:rPr lang="en-US" sz="1400" b="0" i="0" u="none" strike="noStrike">
+                          <a:solidFill>
+                            <a:srgbClr val="000000"/>
+                          </a:solidFill>
+                          <a:effectLst/>
+                          <a:latin typeface="Calibri"/>
+                        </a:rPr>
+                        <a:t>$7,175</a:t>
+                      </a:r>
+                    </a:p>
+                  </a:txBody>
+                  <a:tcPr marL="7620" marR="7620" marT="7620" marB="0" anchor="b">
+                    <a:lnL w="6350" cap="flat" cmpd="sng" algn="ctr">
+                      <a:solidFill>
+                        <a:srgbClr val="000000"/>
+                      </a:solidFill>
+                      <a:prstDash val="solid"/>
+                      <a:round/>
+                      <a:headEnd type="none" w="med" len="med"/>
+                      <a:tailEnd type="none" w="med" len="med"/>
+                    </a:lnL>
+                    <a:lnR w="12700" cap="flat" cmpd="sng" algn="ctr">
+                      <a:solidFill>
+                        <a:srgbClr val="000000"/>
+                      </a:solidFill>
+                      <a:prstDash val="solid"/>
+                      <a:round/>
+                      <a:headEnd type="none" w="med" len="med"/>
+                      <a:tailEnd type="none" w="med" len="med"/>
+                    </a:lnR>
+                    <a:lnT w="12700" cap="flat" cmpd="sng" algn="ctr">
+                      <a:solidFill>
+                        <a:srgbClr val="000000"/>
+                      </a:solidFill>
+                      <a:prstDash val="solid"/>
+                      <a:round/>
+                      <a:headEnd type="none" w="med" len="med"/>
+                      <a:tailEnd type="none" w="med" len="med"/>
+                    </a:lnT>
+                    <a:lnB w="6350" cap="flat" cmpd="sng" algn="ctr">
+                      <a:solidFill>
+                        <a:srgbClr val="000000"/>
+                      </a:solidFill>
+                      <a:prstDash val="solid"/>
+                      <a:round/>
+                      <a:headEnd type="none" w="med" len="med"/>
+                      <a:tailEnd type="none" w="med" len="med"/>
+                    </a:lnB>
+                  </a:tcPr>
+                </a:tc>
+              </a:tr>
+              <a:tr h="207746">
+                <a:tc>
+                  <a:txBody>
+                    <a:bodyPr/>
+                    <a:lstStyle/>
+                    <a:p>
+                      <a:pPr algn="l" fontAlgn="b"/>
+                      <a:r>
+                        <a:rPr lang="en-US" sz="1400" b="0" i="0" u="none" strike="noStrike">
+                          <a:solidFill>
+                            <a:srgbClr val="000000"/>
+                          </a:solidFill>
+                          <a:effectLst/>
+                          <a:latin typeface="Calibri"/>
+                        </a:rPr>
+                        <a:t>Control Station &amp; Software</a:t>
+                      </a:r>
+                    </a:p>
+                  </a:txBody>
+                  <a:tcPr marL="7620" marR="7620" marT="7620" marB="0" anchor="b">
+                    <a:lnL w="12700" cap="flat" cmpd="sng" algn="ctr">
+                      <a:solidFill>
+                        <a:srgbClr val="000000"/>
+                      </a:solidFill>
+                      <a:prstDash val="solid"/>
+                      <a:round/>
+                      <a:headEnd type="none" w="med" len="med"/>
+                      <a:tailEnd type="none" w="med" len="med"/>
+                    </a:lnL>
+                    <a:lnR w="6350" cap="flat" cmpd="sng" algn="ctr">
+                      <a:solidFill>
+                        <a:srgbClr val="000000"/>
+                      </a:solidFill>
+                      <a:prstDash val="solid"/>
+                      <a:round/>
+                      <a:headEnd type="none" w="med" len="med"/>
+                      <a:tailEnd type="none" w="med" len="med"/>
+                    </a:lnR>
+                    <a:lnT w="6350" cap="flat" cmpd="sng" algn="ctr">
+                      <a:solidFill>
+                        <a:srgbClr val="000000"/>
+                      </a:solidFill>
+                      <a:prstDash val="solid"/>
+                      <a:round/>
+                      <a:headEnd type="none" w="med" len="med"/>
+                      <a:tailEnd type="none" w="med" len="med"/>
+                    </a:lnT>
+                    <a:lnB w="6350" cap="flat" cmpd="sng" algn="ctr">
+                      <a:solidFill>
+                        <a:srgbClr val="000000"/>
+                      </a:solidFill>
+                      <a:prstDash val="solid"/>
+                      <a:round/>
+                      <a:headEnd type="none" w="med" len="med"/>
+                      <a:tailEnd type="none" w="med" len="med"/>
+                    </a:lnB>
+                  </a:tcPr>
+                </a:tc>
+                <a:tc>
+                  <a:txBody>
+                    <a:bodyPr/>
+                    <a:lstStyle/>
+                    <a:p>
+                      <a:pPr algn="r" fontAlgn="b"/>
+                      <a:r>
+                        <a:rPr lang="en-US" sz="1400" b="0" i="0" u="none" strike="noStrike">
+                          <a:solidFill>
+                            <a:srgbClr val="000000"/>
+                          </a:solidFill>
+                          <a:effectLst/>
+                          <a:latin typeface="Calibri"/>
+                        </a:rPr>
+                        <a:t>$3,505</a:t>
+                      </a:r>
+                    </a:p>
+                  </a:txBody>
+                  <a:tcPr marL="7620" marR="7620" marT="7620" marB="0" anchor="b">
+                    <a:lnL w="6350" cap="flat" cmpd="sng" algn="ctr">
+                      <a:solidFill>
+                        <a:srgbClr val="000000"/>
+                      </a:solidFill>
+                      <a:prstDash val="solid"/>
+                      <a:round/>
+                      <a:headEnd type="none" w="med" len="med"/>
+                      <a:tailEnd type="none" w="med" len="med"/>
+                    </a:lnL>
+                    <a:lnR w="12700" cap="flat" cmpd="sng" algn="ctr">
+                      <a:solidFill>
+                        <a:srgbClr val="000000"/>
+                      </a:solidFill>
+                      <a:prstDash val="solid"/>
+                      <a:round/>
+                      <a:headEnd type="none" w="med" len="med"/>
+                      <a:tailEnd type="none" w="med" len="med"/>
+                    </a:lnR>
+                    <a:lnT w="6350" cap="flat" cmpd="sng" algn="ctr">
+                      <a:solidFill>
+                        <a:srgbClr val="000000"/>
+                      </a:solidFill>
+                      <a:prstDash val="solid"/>
+                      <a:round/>
+                      <a:headEnd type="none" w="med" len="med"/>
+                      <a:tailEnd type="none" w="med" len="med"/>
+                    </a:lnT>
+                    <a:lnB w="6350" cap="flat" cmpd="sng" algn="ctr">
+                      <a:solidFill>
+                        <a:srgbClr val="000000"/>
+                      </a:solidFill>
+                      <a:prstDash val="solid"/>
+                      <a:round/>
+                      <a:headEnd type="none" w="med" len="med"/>
+                      <a:tailEnd type="none" w="med" len="med"/>
+                    </a:lnB>
+                  </a:tcPr>
+                </a:tc>
+              </a:tr>
+              <a:tr h="207746">
+                <a:tc>
+                  <a:txBody>
+                    <a:bodyPr/>
+                    <a:lstStyle/>
+                    <a:p>
+                      <a:pPr algn="l" fontAlgn="b"/>
+                      <a:r>
+                        <a:rPr lang="en-US" sz="1400" b="0" i="0" u="none" strike="noStrike">
+                          <a:solidFill>
+                            <a:srgbClr val="000000"/>
+                          </a:solidFill>
+                          <a:effectLst/>
+                          <a:latin typeface="Calibri"/>
+                        </a:rPr>
+                        <a:t>Thermocouples</a:t>
+                      </a:r>
+                    </a:p>
+                  </a:txBody>
+                  <a:tcPr marL="7620" marR="7620" marT="7620" marB="0" anchor="b">
+                    <a:lnL w="12700" cap="flat" cmpd="sng" algn="ctr">
+                      <a:solidFill>
+                        <a:srgbClr val="000000"/>
+                      </a:solidFill>
+                      <a:prstDash val="solid"/>
+                      <a:round/>
+                      <a:headEnd type="none" w="med" len="med"/>
+                      <a:tailEnd type="none" w="med" len="med"/>
+                    </a:lnL>
+                    <a:lnR w="6350" cap="flat" cmpd="sng" algn="ctr">
+                      <a:solidFill>
+                        <a:srgbClr val="000000"/>
+                      </a:solidFill>
+                      <a:prstDash val="solid"/>
+                      <a:round/>
+                      <a:headEnd type="none" w="med" len="med"/>
+                      <a:tailEnd type="none" w="med" len="med"/>
+                    </a:lnR>
+                    <a:lnT w="6350" cap="flat" cmpd="sng" algn="ctr">
+                      <a:solidFill>
+                        <a:srgbClr val="000000"/>
+                      </a:solidFill>
+                      <a:prstDash val="solid"/>
+                      <a:round/>
+                      <a:headEnd type="none" w="med" len="med"/>
+                      <a:tailEnd type="none" w="med" len="med"/>
+                    </a:lnT>
+                    <a:lnB w="6350" cap="flat" cmpd="sng" algn="ctr">
+                      <a:solidFill>
+                        <a:srgbClr val="000000"/>
+                      </a:solidFill>
+                      <a:prstDash val="solid"/>
+                      <a:round/>
+                      <a:headEnd type="none" w="med" len="med"/>
+                      <a:tailEnd type="none" w="med" len="med"/>
+                    </a:lnB>
+                  </a:tcPr>
+                </a:tc>
+                <a:tc>
+                  <a:txBody>
+                    <a:bodyPr/>
+                    <a:lstStyle/>
+                    <a:p>
+                      <a:pPr algn="r" fontAlgn="b"/>
+                      <a:r>
+                        <a:rPr lang="en-US" sz="1400" b="0" i="0" u="none" strike="noStrike">
+                          <a:solidFill>
+                            <a:srgbClr val="000000"/>
+                          </a:solidFill>
+                          <a:effectLst/>
+                          <a:latin typeface="Calibri"/>
+                        </a:rPr>
+                        <a:t>$500</a:t>
+                      </a:r>
+                    </a:p>
+                  </a:txBody>
+                  <a:tcPr marL="7620" marR="7620" marT="7620" marB="0" anchor="b">
+                    <a:lnL w="6350" cap="flat" cmpd="sng" algn="ctr">
+                      <a:solidFill>
+                        <a:srgbClr val="000000"/>
+                      </a:solidFill>
+                      <a:prstDash val="solid"/>
+                      <a:round/>
+                      <a:headEnd type="none" w="med" len="med"/>
+                      <a:tailEnd type="none" w="med" len="med"/>
+                    </a:lnL>
+                    <a:lnR w="12700" cap="flat" cmpd="sng" algn="ctr">
+                      <a:solidFill>
+                        <a:srgbClr val="000000"/>
+                      </a:solidFill>
+                      <a:prstDash val="solid"/>
+                      <a:round/>
+                      <a:headEnd type="none" w="med" len="med"/>
+                      <a:tailEnd type="none" w="med" len="med"/>
+                    </a:lnR>
+                    <a:lnT w="6350" cap="flat" cmpd="sng" algn="ctr">
+                      <a:solidFill>
+                        <a:srgbClr val="000000"/>
+                      </a:solidFill>
+                      <a:prstDash val="solid"/>
+                      <a:round/>
+                      <a:headEnd type="none" w="med" len="med"/>
+                      <a:tailEnd type="none" w="med" len="med"/>
+                    </a:lnT>
+                    <a:lnB w="6350" cap="flat" cmpd="sng" algn="ctr">
+                      <a:solidFill>
+                        <a:srgbClr val="000000"/>
+                      </a:solidFill>
+                      <a:prstDash val="solid"/>
+                      <a:round/>
+                      <a:headEnd type="none" w="med" len="med"/>
+                      <a:tailEnd type="none" w="med" len="med"/>
+                    </a:lnB>
+                  </a:tcPr>
+                </a:tc>
+              </a:tr>
+              <a:tr h="207746">
+                <a:tc>
+                  <a:txBody>
+                    <a:bodyPr/>
+                    <a:lstStyle/>
+                    <a:p>
+                      <a:pPr algn="l" fontAlgn="b"/>
+                      <a:r>
+                        <a:rPr lang="en-US" sz="1400" b="0" i="0" u="none" strike="noStrike" dirty="0">
+                          <a:solidFill>
+                            <a:srgbClr val="000000"/>
+                          </a:solidFill>
+                          <a:effectLst/>
+                          <a:latin typeface="Calibri"/>
+                        </a:rPr>
+                        <a:t>Pressure transducers</a:t>
+                      </a:r>
+                    </a:p>
+                  </a:txBody>
+                  <a:tcPr marL="7620" marR="7620" marT="7620" marB="0" anchor="b">
+                    <a:lnL w="12700" cap="flat" cmpd="sng" algn="ctr">
+                      <a:solidFill>
+                        <a:srgbClr val="000000"/>
+                      </a:solidFill>
+                      <a:prstDash val="solid"/>
+                      <a:round/>
+                      <a:headEnd type="none" w="med" len="med"/>
+                      <a:tailEnd type="none" w="med" len="med"/>
+                    </a:lnL>
+                    <a:lnR w="6350" cap="flat" cmpd="sng" algn="ctr">
+                      <a:solidFill>
+                        <a:srgbClr val="000000"/>
+                      </a:solidFill>
+                      <a:prstDash val="solid"/>
+                      <a:round/>
+                      <a:headEnd type="none" w="med" len="med"/>
+                      <a:tailEnd type="none" w="med" len="med"/>
+                    </a:lnR>
+                    <a:lnT w="6350" cap="flat" cmpd="sng" algn="ctr">
+                      <a:solidFill>
+                        <a:srgbClr val="000000"/>
+                      </a:solidFill>
+                      <a:prstDash val="solid"/>
+                      <a:round/>
+                      <a:headEnd type="none" w="med" len="med"/>
+                      <a:tailEnd type="none" w="med" len="med"/>
+                    </a:lnT>
+                    <a:lnB w="6350" cap="flat" cmpd="sng" algn="ctr">
+                      <a:solidFill>
+                        <a:srgbClr val="000000"/>
+                      </a:solidFill>
+                      <a:prstDash val="solid"/>
+                      <a:round/>
+                      <a:headEnd type="none" w="med" len="med"/>
+                      <a:tailEnd type="none" w="med" len="med"/>
+                    </a:lnB>
+                  </a:tcPr>
+                </a:tc>
+                <a:tc>
+                  <a:txBody>
+                    <a:bodyPr/>
+                    <a:lstStyle/>
+                    <a:p>
+                      <a:pPr algn="r" fontAlgn="b"/>
+                      <a:r>
+                        <a:rPr lang="en-US" sz="1400" b="0" i="0" u="none" strike="noStrike" dirty="0">
+                          <a:solidFill>
+                            <a:srgbClr val="000000"/>
+                          </a:solidFill>
+                          <a:effectLst/>
+                          <a:latin typeface="Calibri"/>
+                        </a:rPr>
+                        <a:t>$1,500</a:t>
+                      </a:r>
+                    </a:p>
+                  </a:txBody>
+                  <a:tcPr marL="7620" marR="7620" marT="7620" marB="0" anchor="b">
+                    <a:lnL w="6350" cap="flat" cmpd="sng" algn="ctr">
+                      <a:solidFill>
+                        <a:srgbClr val="000000"/>
+                      </a:solidFill>
+                      <a:prstDash val="solid"/>
+                      <a:round/>
+                      <a:headEnd type="none" w="med" len="med"/>
+                      <a:tailEnd type="none" w="med" len="med"/>
+                    </a:lnL>
+                    <a:lnR w="12700" cap="flat" cmpd="sng" algn="ctr">
+                      <a:solidFill>
+                        <a:srgbClr val="000000"/>
+                      </a:solidFill>
+                      <a:prstDash val="solid"/>
+                      <a:round/>
+                      <a:headEnd type="none" w="med" len="med"/>
+                      <a:tailEnd type="none" w="med" len="med"/>
+                    </a:lnR>
+                    <a:lnT w="6350" cap="flat" cmpd="sng" algn="ctr">
+                      <a:solidFill>
+                        <a:srgbClr val="000000"/>
+                      </a:solidFill>
+                      <a:prstDash val="solid"/>
+                      <a:round/>
+                      <a:headEnd type="none" w="med" len="med"/>
+                      <a:tailEnd type="none" w="med" len="med"/>
+                    </a:lnT>
+                    <a:lnB w="6350" cap="flat" cmpd="sng" algn="ctr">
+                      <a:solidFill>
+                        <a:srgbClr val="000000"/>
+                      </a:solidFill>
+                      <a:prstDash val="solid"/>
+                      <a:round/>
+                      <a:headEnd type="none" w="med" len="med"/>
+                      <a:tailEnd type="none" w="med" len="med"/>
+                    </a:lnB>
+                  </a:tcPr>
+                </a:tc>
+              </a:tr>
+              <a:tr h="207746">
+                <a:tc>
+                  <a:txBody>
+                    <a:bodyPr/>
+                    <a:lstStyle/>
+                    <a:p>
+                      <a:pPr algn="l" fontAlgn="b"/>
+                      <a:r>
+                        <a:rPr lang="en-US" sz="1400" b="0" i="0" u="none" strike="noStrike">
+                          <a:solidFill>
+                            <a:srgbClr val="000000"/>
+                          </a:solidFill>
+                          <a:effectLst/>
+                          <a:latin typeface="Calibri"/>
+                        </a:rPr>
+                        <a:t>Temperature display</a:t>
+                      </a:r>
+                    </a:p>
+                  </a:txBody>
+                  <a:tcPr marL="7620" marR="7620" marT="7620" marB="0" anchor="b">
+                    <a:lnL w="12700" cap="flat" cmpd="sng" algn="ctr">
+                      <a:solidFill>
+                        <a:srgbClr val="000000"/>
+                      </a:solidFill>
+                      <a:prstDash val="solid"/>
+                      <a:round/>
+                      <a:headEnd type="none" w="med" len="med"/>
+                      <a:tailEnd type="none" w="med" len="med"/>
+                    </a:lnL>
+                    <a:lnR w="6350" cap="flat" cmpd="sng" algn="ctr">
+                      <a:solidFill>
+                        <a:srgbClr val="000000"/>
+                      </a:solidFill>
+                      <a:prstDash val="solid"/>
+                      <a:round/>
+                      <a:headEnd type="none" w="med" len="med"/>
+                      <a:tailEnd type="none" w="med" len="med"/>
+                    </a:lnR>
+                    <a:lnT w="6350" cap="flat" cmpd="sng" algn="ctr">
+                      <a:solidFill>
+                        <a:srgbClr val="000000"/>
+                      </a:solidFill>
+                      <a:prstDash val="solid"/>
+                      <a:round/>
+                      <a:headEnd type="none" w="med" len="med"/>
+                      <a:tailEnd type="none" w="med" len="med"/>
+                    </a:lnT>
+                    <a:lnB w="6350" cap="flat" cmpd="sng" algn="ctr">
+                      <a:solidFill>
+                        <a:srgbClr val="000000"/>
+                      </a:solidFill>
+                      <a:prstDash val="solid"/>
+                      <a:round/>
+                      <a:headEnd type="none" w="med" len="med"/>
+                      <a:tailEnd type="none" w="med" len="med"/>
+                    </a:lnB>
+                  </a:tcPr>
+                </a:tc>
+                <a:tc>
+                  <a:txBody>
+                    <a:bodyPr/>
+                    <a:lstStyle/>
+                    <a:p>
+                      <a:pPr algn="r" fontAlgn="b"/>
+                      <a:r>
+                        <a:rPr lang="en-US" sz="1400" b="0" i="0" u="none" strike="noStrike">
+                          <a:solidFill>
+                            <a:srgbClr val="000000"/>
+                          </a:solidFill>
+                          <a:effectLst/>
+                          <a:latin typeface="Calibri"/>
+                        </a:rPr>
+                        <a:t>$3,300</a:t>
+                      </a:r>
+                    </a:p>
+                  </a:txBody>
+                  <a:tcPr marL="7620" marR="7620" marT="7620" marB="0" anchor="b">
+                    <a:lnL w="6350" cap="flat" cmpd="sng" algn="ctr">
+                      <a:solidFill>
+                        <a:srgbClr val="000000"/>
+                      </a:solidFill>
+                      <a:prstDash val="solid"/>
+                      <a:round/>
+                      <a:headEnd type="none" w="med" len="med"/>
+                      <a:tailEnd type="none" w="med" len="med"/>
+                    </a:lnL>
+                    <a:lnR w="12700" cap="flat" cmpd="sng" algn="ctr">
+                      <a:solidFill>
+                        <a:srgbClr val="000000"/>
+                      </a:solidFill>
+                      <a:prstDash val="solid"/>
+                      <a:round/>
+                      <a:headEnd type="none" w="med" len="med"/>
+                      <a:tailEnd type="none" w="med" len="med"/>
+                    </a:lnR>
+                    <a:lnT w="6350" cap="flat" cmpd="sng" algn="ctr">
+                      <a:solidFill>
+                        <a:srgbClr val="000000"/>
+                      </a:solidFill>
+                      <a:prstDash val="solid"/>
+                      <a:round/>
+                      <a:headEnd type="none" w="med" len="med"/>
+                      <a:tailEnd type="none" w="med" len="med"/>
+                    </a:lnT>
+                    <a:lnB w="6350" cap="flat" cmpd="sng" algn="ctr">
+                      <a:solidFill>
+                        <a:srgbClr val="000000"/>
+                      </a:solidFill>
+                      <a:prstDash val="solid"/>
+                      <a:round/>
+                      <a:headEnd type="none" w="med" len="med"/>
+                      <a:tailEnd type="none" w="med" len="med"/>
+                    </a:lnB>
+                  </a:tcPr>
+                </a:tc>
+              </a:tr>
+              <a:tr h="207746">
+                <a:tc>
+                  <a:txBody>
+                    <a:bodyPr/>
+                    <a:lstStyle/>
+                    <a:p>
+                      <a:pPr algn="l" fontAlgn="b"/>
+                      <a:r>
+                        <a:rPr lang="en-US" sz="1400" b="0" i="0" u="none" strike="noStrike">
+                          <a:solidFill>
+                            <a:srgbClr val="000000"/>
+                          </a:solidFill>
+                          <a:effectLst/>
+                          <a:latin typeface="Calibri"/>
+                        </a:rPr>
+                        <a:t>West &amp; North gate actuators</a:t>
+                      </a:r>
+                    </a:p>
+                  </a:txBody>
+                  <a:tcPr marL="7620" marR="7620" marT="7620" marB="0" anchor="b">
+                    <a:lnL w="12700" cap="flat" cmpd="sng" algn="ctr">
+                      <a:solidFill>
+                        <a:srgbClr val="000000"/>
+                      </a:solidFill>
+                      <a:prstDash val="solid"/>
+                      <a:round/>
+                      <a:headEnd type="none" w="med" len="med"/>
+                      <a:tailEnd type="none" w="med" len="med"/>
+                    </a:lnL>
+                    <a:lnR w="6350" cap="flat" cmpd="sng" algn="ctr">
+                      <a:solidFill>
+                        <a:srgbClr val="000000"/>
+                      </a:solidFill>
+                      <a:prstDash val="solid"/>
+                      <a:round/>
+                      <a:headEnd type="none" w="med" len="med"/>
+                      <a:tailEnd type="none" w="med" len="med"/>
+                    </a:lnR>
+                    <a:lnT w="6350" cap="flat" cmpd="sng" algn="ctr">
+                      <a:solidFill>
+                        <a:srgbClr val="000000"/>
+                      </a:solidFill>
+                      <a:prstDash val="solid"/>
+                      <a:round/>
+                      <a:headEnd type="none" w="med" len="med"/>
+                      <a:tailEnd type="none" w="med" len="med"/>
+                    </a:lnT>
+                    <a:lnB w="6350" cap="flat" cmpd="sng" algn="ctr">
+                      <a:solidFill>
+                        <a:srgbClr val="000000"/>
+                      </a:solidFill>
+                      <a:prstDash val="solid"/>
+                      <a:round/>
+                      <a:headEnd type="none" w="med" len="med"/>
+                      <a:tailEnd type="none" w="med" len="med"/>
+                    </a:lnB>
+                  </a:tcPr>
+                </a:tc>
+                <a:tc>
+                  <a:txBody>
+                    <a:bodyPr/>
+                    <a:lstStyle/>
+                    <a:p>
+                      <a:pPr algn="r" fontAlgn="b"/>
+                      <a:r>
+                        <a:rPr lang="en-US" sz="1400" b="0" i="0" u="none" strike="noStrike">
+                          <a:solidFill>
+                            <a:srgbClr val="000000"/>
+                          </a:solidFill>
+                          <a:effectLst/>
+                          <a:latin typeface="Calibri"/>
+                        </a:rPr>
+                        <a:t>$300</a:t>
+                      </a:r>
+                    </a:p>
+                  </a:txBody>
+                  <a:tcPr marL="7620" marR="7620" marT="7620" marB="0" anchor="b">
+                    <a:lnL w="6350" cap="flat" cmpd="sng" algn="ctr">
+                      <a:solidFill>
+                        <a:srgbClr val="000000"/>
+                      </a:solidFill>
+                      <a:prstDash val="solid"/>
+                      <a:round/>
+                      <a:headEnd type="none" w="med" len="med"/>
+                      <a:tailEnd type="none" w="med" len="med"/>
+                    </a:lnL>
+                    <a:lnR w="12700" cap="flat" cmpd="sng" algn="ctr">
+                      <a:solidFill>
+                        <a:srgbClr val="000000"/>
+                      </a:solidFill>
+                      <a:prstDash val="solid"/>
+                      <a:round/>
+                      <a:headEnd type="none" w="med" len="med"/>
+                      <a:tailEnd type="none" w="med" len="med"/>
+                    </a:lnR>
+                    <a:lnT w="6350" cap="flat" cmpd="sng" algn="ctr">
+                      <a:solidFill>
+                        <a:srgbClr val="000000"/>
+                      </a:solidFill>
+                      <a:prstDash val="solid"/>
+                      <a:round/>
+                      <a:headEnd type="none" w="med" len="med"/>
+                      <a:tailEnd type="none" w="med" len="med"/>
+                    </a:lnT>
+                    <a:lnB w="6350" cap="flat" cmpd="sng" algn="ctr">
+                      <a:solidFill>
+                        <a:srgbClr val="000000"/>
+                      </a:solidFill>
+                      <a:prstDash val="solid"/>
+                      <a:round/>
+                      <a:headEnd type="none" w="med" len="med"/>
+                      <a:tailEnd type="none" w="med" len="med"/>
+                    </a:lnB>
+                  </a:tcPr>
+                </a:tc>
+              </a:tr>
+              <a:tr h="207746">
+                <a:tc>
+                  <a:txBody>
+                    <a:bodyPr/>
+                    <a:lstStyle/>
+                    <a:p>
+                      <a:pPr algn="l" fontAlgn="b"/>
+                      <a:r>
+                        <a:rPr lang="en-US" sz="1400" b="0" i="0" u="none" strike="noStrike">
+                          <a:solidFill>
+                            <a:srgbClr val="000000"/>
+                          </a:solidFill>
+                          <a:effectLst/>
+                          <a:latin typeface="Calibri"/>
+                        </a:rPr>
+                        <a:t>copper tubing - pressure sensors</a:t>
+                      </a:r>
+                    </a:p>
+                  </a:txBody>
+                  <a:tcPr marL="7620" marR="7620" marT="7620" marB="0" anchor="b">
+                    <a:lnL w="12700" cap="flat" cmpd="sng" algn="ctr">
+                      <a:solidFill>
+                        <a:srgbClr val="000000"/>
+                      </a:solidFill>
+                      <a:prstDash val="solid"/>
+                      <a:round/>
+                      <a:headEnd type="none" w="med" len="med"/>
+                      <a:tailEnd type="none" w="med" len="med"/>
+                    </a:lnL>
+                    <a:lnR w="6350" cap="flat" cmpd="sng" algn="ctr">
+                      <a:solidFill>
+                        <a:srgbClr val="000000"/>
+                      </a:solidFill>
+                      <a:prstDash val="solid"/>
+                      <a:round/>
+                      <a:headEnd type="none" w="med" len="med"/>
+                      <a:tailEnd type="none" w="med" len="med"/>
+                    </a:lnR>
+                    <a:lnT w="6350" cap="flat" cmpd="sng" algn="ctr">
+                      <a:solidFill>
+                        <a:srgbClr val="000000"/>
+                      </a:solidFill>
+                      <a:prstDash val="solid"/>
+                      <a:round/>
+                      <a:headEnd type="none" w="med" len="med"/>
+                      <a:tailEnd type="none" w="med" len="med"/>
+                    </a:lnT>
+                    <a:lnB w="6350" cap="flat" cmpd="sng" algn="ctr">
+                      <a:solidFill>
+                        <a:srgbClr val="000000"/>
+                      </a:solidFill>
+                      <a:prstDash val="solid"/>
+                      <a:round/>
+                      <a:headEnd type="none" w="med" len="med"/>
+                      <a:tailEnd type="none" w="med" len="med"/>
+                    </a:lnB>
+                  </a:tcPr>
+                </a:tc>
+                <a:tc>
+                  <a:txBody>
+                    <a:bodyPr/>
+                    <a:lstStyle/>
+                    <a:p>
+                      <a:pPr algn="r" fontAlgn="b"/>
+                      <a:r>
+                        <a:rPr lang="en-US" sz="1400" b="0" i="0" u="none" strike="noStrike">
+                          <a:solidFill>
+                            <a:srgbClr val="000000"/>
+                          </a:solidFill>
+                          <a:effectLst/>
+                          <a:latin typeface="Calibri"/>
+                        </a:rPr>
+                        <a:t>$360</a:t>
+                      </a:r>
+                    </a:p>
+                  </a:txBody>
+                  <a:tcPr marL="7620" marR="7620" marT="7620" marB="0" anchor="b">
+                    <a:lnL w="6350" cap="flat" cmpd="sng" algn="ctr">
+                      <a:solidFill>
+                        <a:srgbClr val="000000"/>
+                      </a:solidFill>
+                      <a:prstDash val="solid"/>
+                      <a:round/>
+                      <a:headEnd type="none" w="med" len="med"/>
+                      <a:tailEnd type="none" w="med" len="med"/>
+                    </a:lnL>
+                    <a:lnR w="12700" cap="flat" cmpd="sng" algn="ctr">
+                      <a:solidFill>
+                        <a:srgbClr val="000000"/>
+                      </a:solidFill>
+                      <a:prstDash val="solid"/>
+                      <a:round/>
+                      <a:headEnd type="none" w="med" len="med"/>
+                      <a:tailEnd type="none" w="med" len="med"/>
+                    </a:lnR>
+                    <a:lnT w="6350" cap="flat" cmpd="sng" algn="ctr">
+                      <a:solidFill>
+                        <a:srgbClr val="000000"/>
+                      </a:solidFill>
+                      <a:prstDash val="solid"/>
+                      <a:round/>
+                      <a:headEnd type="none" w="med" len="med"/>
+                      <a:tailEnd type="none" w="med" len="med"/>
+                    </a:lnT>
+                    <a:lnB w="6350" cap="flat" cmpd="sng" algn="ctr">
+                      <a:solidFill>
+                        <a:srgbClr val="000000"/>
+                      </a:solidFill>
+                      <a:prstDash val="solid"/>
+                      <a:round/>
+                      <a:headEnd type="none" w="med" len="med"/>
+                      <a:tailEnd type="none" w="med" len="med"/>
+                    </a:lnB>
+                  </a:tcPr>
+                </a:tc>
+              </a:tr>
+              <a:tr h="207746">
+                <a:tc>
+                  <a:txBody>
+                    <a:bodyPr/>
+                    <a:lstStyle/>
+                    <a:p>
+                      <a:pPr algn="l" fontAlgn="b"/>
+                      <a:r>
+                        <a:rPr lang="en-US" sz="1400" b="0" i="0" u="none" strike="noStrike">
+                          <a:solidFill>
+                            <a:srgbClr val="000000"/>
+                          </a:solidFill>
+                          <a:effectLst/>
+                          <a:latin typeface="Calibri"/>
+                        </a:rPr>
+                        <a:t>Electrical Cabinet</a:t>
+                      </a:r>
+                    </a:p>
+                  </a:txBody>
+                  <a:tcPr marL="7620" marR="7620" marT="7620" marB="0" anchor="b">
+                    <a:lnL w="12700" cap="flat" cmpd="sng" algn="ctr">
+                      <a:solidFill>
+                        <a:srgbClr val="000000"/>
+                      </a:solidFill>
+                      <a:prstDash val="solid"/>
+                      <a:round/>
+                      <a:headEnd type="none" w="med" len="med"/>
+                      <a:tailEnd type="none" w="med" len="med"/>
+                    </a:lnL>
+                    <a:lnR w="6350" cap="flat" cmpd="sng" algn="ctr">
+                      <a:solidFill>
+                        <a:srgbClr val="000000"/>
+                      </a:solidFill>
+                      <a:prstDash val="solid"/>
+                      <a:round/>
+                      <a:headEnd type="none" w="med" len="med"/>
+                      <a:tailEnd type="none" w="med" len="med"/>
+                    </a:lnR>
+                    <a:lnT w="6350" cap="flat" cmpd="sng" algn="ctr">
+                      <a:solidFill>
+                        <a:srgbClr val="000000"/>
+                      </a:solidFill>
+                      <a:prstDash val="solid"/>
+                      <a:round/>
+                      <a:headEnd type="none" w="med" len="med"/>
+                      <a:tailEnd type="none" w="med" len="med"/>
+                    </a:lnT>
+                    <a:lnB w="6350" cap="flat" cmpd="sng" algn="ctr">
+                      <a:solidFill>
+                        <a:srgbClr val="000000"/>
+                      </a:solidFill>
+                      <a:prstDash val="solid"/>
+                      <a:round/>
+                      <a:headEnd type="none" w="med" len="med"/>
+                      <a:tailEnd type="none" w="med" len="med"/>
+                    </a:lnB>
+                  </a:tcPr>
+                </a:tc>
+                <a:tc>
+                  <a:txBody>
+                    <a:bodyPr/>
+                    <a:lstStyle/>
+                    <a:p>
+                      <a:pPr algn="r" fontAlgn="b"/>
+                      <a:r>
+                        <a:rPr lang="en-US" sz="1400" b="0" i="0" u="none" strike="noStrike">
+                          <a:solidFill>
+                            <a:srgbClr val="000000"/>
+                          </a:solidFill>
+                          <a:effectLst/>
+                          <a:latin typeface="Calibri"/>
+                        </a:rPr>
+                        <a:t>$2,200</a:t>
+                      </a:r>
+                    </a:p>
+                  </a:txBody>
+                  <a:tcPr marL="7620" marR="7620" marT="7620" marB="0" anchor="b">
+                    <a:lnL w="6350" cap="flat" cmpd="sng" algn="ctr">
+                      <a:solidFill>
+                        <a:srgbClr val="000000"/>
+                      </a:solidFill>
+                      <a:prstDash val="solid"/>
+                      <a:round/>
+                      <a:headEnd type="none" w="med" len="med"/>
+                      <a:tailEnd type="none" w="med" len="med"/>
+                    </a:lnL>
+                    <a:lnR w="12700" cap="flat" cmpd="sng" algn="ctr">
+                      <a:solidFill>
+                        <a:srgbClr val="000000"/>
+                      </a:solidFill>
+                      <a:prstDash val="solid"/>
+                      <a:round/>
+                      <a:headEnd type="none" w="med" len="med"/>
+                      <a:tailEnd type="none" w="med" len="med"/>
+                    </a:lnR>
+                    <a:lnT w="6350" cap="flat" cmpd="sng" algn="ctr">
+                      <a:solidFill>
+                        <a:srgbClr val="000000"/>
+                      </a:solidFill>
+                      <a:prstDash val="solid"/>
+                      <a:round/>
+                      <a:headEnd type="none" w="med" len="med"/>
+                      <a:tailEnd type="none" w="med" len="med"/>
+                    </a:lnT>
+                    <a:lnB w="6350" cap="flat" cmpd="sng" algn="ctr">
+                      <a:solidFill>
+                        <a:srgbClr val="000000"/>
+                      </a:solidFill>
+                      <a:prstDash val="solid"/>
+                      <a:round/>
+                      <a:headEnd type="none" w="med" len="med"/>
+                      <a:tailEnd type="none" w="med" len="med"/>
+                    </a:lnB>
+                  </a:tcPr>
+                </a:tc>
+              </a:tr>
+              <a:tr h="207746">
+                <a:tc>
+                  <a:txBody>
+                    <a:bodyPr/>
+                    <a:lstStyle/>
+                    <a:p>
+                      <a:pPr algn="l" fontAlgn="b"/>
+                      <a:r>
+                        <a:rPr lang="en-US" sz="1400" b="0" i="0" u="none" strike="noStrike">
+                          <a:solidFill>
+                            <a:srgbClr val="000000"/>
+                          </a:solidFill>
+                          <a:effectLst/>
+                          <a:latin typeface="Calibri"/>
+                        </a:rPr>
+                        <a:t>Wiring</a:t>
+                      </a:r>
+                    </a:p>
+                  </a:txBody>
+                  <a:tcPr marL="7620" marR="7620" marT="7620" marB="0" anchor="b">
+                    <a:lnL w="12700" cap="flat" cmpd="sng" algn="ctr">
+                      <a:solidFill>
+                        <a:srgbClr val="000000"/>
+                      </a:solidFill>
+                      <a:prstDash val="solid"/>
+                      <a:round/>
+                      <a:headEnd type="none" w="med" len="med"/>
+                      <a:tailEnd type="none" w="med" len="med"/>
+                    </a:lnL>
+                    <a:lnR w="6350" cap="flat" cmpd="sng" algn="ctr">
+                      <a:solidFill>
+                        <a:srgbClr val="000000"/>
+                      </a:solidFill>
+                      <a:prstDash val="solid"/>
+                      <a:round/>
+                      <a:headEnd type="none" w="med" len="med"/>
+                      <a:tailEnd type="none" w="med" len="med"/>
+                    </a:lnR>
+                    <a:lnT w="6350" cap="flat" cmpd="sng" algn="ctr">
+                      <a:solidFill>
+                        <a:srgbClr val="000000"/>
+                      </a:solidFill>
+                      <a:prstDash val="solid"/>
+                      <a:round/>
+                      <a:headEnd type="none" w="med" len="med"/>
+                      <a:tailEnd type="none" w="med" len="med"/>
+                    </a:lnT>
+                    <a:lnB w="6350" cap="flat" cmpd="sng" algn="ctr">
+                      <a:solidFill>
+                        <a:srgbClr val="000000"/>
+                      </a:solidFill>
+                      <a:prstDash val="solid"/>
+                      <a:round/>
+                      <a:headEnd type="none" w="med" len="med"/>
+                      <a:tailEnd type="none" w="med" len="med"/>
+                    </a:lnB>
+                  </a:tcPr>
+                </a:tc>
+                <a:tc>
+                  <a:txBody>
+                    <a:bodyPr/>
+                    <a:lstStyle/>
+                    <a:p>
+                      <a:pPr algn="r" fontAlgn="b"/>
+                      <a:r>
+                        <a:rPr lang="en-US" sz="1400" b="0" i="0" u="none" strike="noStrike">
+                          <a:solidFill>
+                            <a:srgbClr val="000000"/>
+                          </a:solidFill>
+                          <a:effectLst/>
+                          <a:latin typeface="Calibri"/>
+                        </a:rPr>
+                        <a:t>$215</a:t>
+                      </a:r>
+                    </a:p>
+                  </a:txBody>
+                  <a:tcPr marL="7620" marR="7620" marT="7620" marB="0" anchor="b">
+                    <a:lnL w="6350" cap="flat" cmpd="sng" algn="ctr">
+                      <a:solidFill>
+                        <a:srgbClr val="000000"/>
+                      </a:solidFill>
+                      <a:prstDash val="solid"/>
+                      <a:round/>
+                      <a:headEnd type="none" w="med" len="med"/>
+                      <a:tailEnd type="none" w="med" len="med"/>
+                    </a:lnL>
+                    <a:lnR w="12700" cap="flat" cmpd="sng" algn="ctr">
+                      <a:solidFill>
+                        <a:srgbClr val="000000"/>
+                      </a:solidFill>
+                      <a:prstDash val="solid"/>
+                      <a:round/>
+                      <a:headEnd type="none" w="med" len="med"/>
+                      <a:tailEnd type="none" w="med" len="med"/>
+                    </a:lnR>
+                    <a:lnT w="6350" cap="flat" cmpd="sng" algn="ctr">
+                      <a:solidFill>
+                        <a:srgbClr val="000000"/>
+                      </a:solidFill>
+                      <a:prstDash val="solid"/>
+                      <a:round/>
+                      <a:headEnd type="none" w="med" len="med"/>
+                      <a:tailEnd type="none" w="med" len="med"/>
+                    </a:lnT>
+                    <a:lnB w="6350" cap="flat" cmpd="sng" algn="ctr">
+                      <a:solidFill>
+                        <a:srgbClr val="000000"/>
+                      </a:solidFill>
+                      <a:prstDash val="solid"/>
+                      <a:round/>
+                      <a:headEnd type="none" w="med" len="med"/>
+                      <a:tailEnd type="none" w="med" len="med"/>
+                    </a:lnB>
+                  </a:tcPr>
+                </a:tc>
+              </a:tr>
+              <a:tr h="207746">
+                <a:tc>
+                  <a:txBody>
+                    <a:bodyPr/>
+                    <a:lstStyle/>
+                    <a:p>
+                      <a:pPr algn="l" fontAlgn="b"/>
+                      <a:r>
+                        <a:rPr lang="en-US" sz="1400" b="0" i="0" u="none" strike="noStrike">
+                          <a:solidFill>
+                            <a:srgbClr val="000000"/>
+                          </a:solidFill>
+                          <a:effectLst/>
+                          <a:latin typeface="Calibri"/>
+                        </a:rPr>
+                        <a:t>Conduit</a:t>
+                      </a:r>
+                    </a:p>
+                  </a:txBody>
+                  <a:tcPr marL="7620" marR="7620" marT="7620" marB="0" anchor="b">
+                    <a:lnL w="12700" cap="flat" cmpd="sng" algn="ctr">
+                      <a:solidFill>
+                        <a:srgbClr val="000000"/>
+                      </a:solidFill>
+                      <a:prstDash val="solid"/>
+                      <a:round/>
+                      <a:headEnd type="none" w="med" len="med"/>
+                      <a:tailEnd type="none" w="med" len="med"/>
+                    </a:lnL>
+                    <a:lnR w="6350" cap="flat" cmpd="sng" algn="ctr">
+                      <a:solidFill>
+                        <a:srgbClr val="000000"/>
+                      </a:solidFill>
+                      <a:prstDash val="solid"/>
+                      <a:round/>
+                      <a:headEnd type="none" w="med" len="med"/>
+                      <a:tailEnd type="none" w="med" len="med"/>
+                    </a:lnR>
+                    <a:lnT w="6350" cap="flat" cmpd="sng" algn="ctr">
+                      <a:solidFill>
+                        <a:srgbClr val="000000"/>
+                      </a:solidFill>
+                      <a:prstDash val="solid"/>
+                      <a:round/>
+                      <a:headEnd type="none" w="med" len="med"/>
+                      <a:tailEnd type="none" w="med" len="med"/>
+                    </a:lnT>
+                    <a:lnB w="6350" cap="flat" cmpd="sng" algn="ctr">
+                      <a:solidFill>
+                        <a:srgbClr val="000000"/>
+                      </a:solidFill>
+                      <a:prstDash val="solid"/>
+                      <a:round/>
+                      <a:headEnd type="none" w="med" len="med"/>
+                      <a:tailEnd type="none" w="med" len="med"/>
+                    </a:lnB>
+                  </a:tcPr>
+                </a:tc>
+                <a:tc>
+                  <a:txBody>
+                    <a:bodyPr/>
+                    <a:lstStyle/>
+                    <a:p>
+                      <a:pPr algn="r" fontAlgn="b"/>
+                      <a:r>
+                        <a:rPr lang="en-US" sz="1400" b="0" i="0" u="none" strike="noStrike">
+                          <a:solidFill>
+                            <a:srgbClr val="000000"/>
+                          </a:solidFill>
+                          <a:effectLst/>
+                          <a:latin typeface="Calibri"/>
+                        </a:rPr>
+                        <a:t>$50</a:t>
+                      </a:r>
+                    </a:p>
+                  </a:txBody>
+                  <a:tcPr marL="7620" marR="7620" marT="7620" marB="0" anchor="b">
+                    <a:lnL w="6350" cap="flat" cmpd="sng" algn="ctr">
+                      <a:solidFill>
+                        <a:srgbClr val="000000"/>
+                      </a:solidFill>
+                      <a:prstDash val="solid"/>
+                      <a:round/>
+                      <a:headEnd type="none" w="med" len="med"/>
+                      <a:tailEnd type="none" w="med" len="med"/>
+                    </a:lnL>
+                    <a:lnR w="12700" cap="flat" cmpd="sng" algn="ctr">
+                      <a:solidFill>
+                        <a:srgbClr val="000000"/>
+                      </a:solidFill>
+                      <a:prstDash val="solid"/>
+                      <a:round/>
+                      <a:headEnd type="none" w="med" len="med"/>
+                      <a:tailEnd type="none" w="med" len="med"/>
+                    </a:lnR>
+                    <a:lnT w="6350" cap="flat" cmpd="sng" algn="ctr">
+                      <a:solidFill>
+                        <a:srgbClr val="000000"/>
+                      </a:solidFill>
+                      <a:prstDash val="solid"/>
+                      <a:round/>
+                      <a:headEnd type="none" w="med" len="med"/>
+                      <a:tailEnd type="none" w="med" len="med"/>
+                    </a:lnT>
+                    <a:lnB w="6350" cap="flat" cmpd="sng" algn="ctr">
+                      <a:solidFill>
+                        <a:srgbClr val="000000"/>
+                      </a:solidFill>
+                      <a:prstDash val="solid"/>
+                      <a:round/>
+                      <a:headEnd type="none" w="med" len="med"/>
+                      <a:tailEnd type="none" w="med" len="med"/>
+                    </a:lnB>
+                  </a:tcPr>
+                </a:tc>
+              </a:tr>
+              <a:tr h="207746">
+                <a:tc>
+                  <a:txBody>
+                    <a:bodyPr/>
+                    <a:lstStyle/>
+                    <a:p>
+                      <a:pPr algn="l" fontAlgn="b"/>
+                      <a:r>
+                        <a:rPr lang="en-US" sz="1400" b="0" i="0" u="none" strike="noStrike">
+                          <a:solidFill>
+                            <a:srgbClr val="000000"/>
+                          </a:solidFill>
+                          <a:effectLst/>
+                          <a:latin typeface="Calibri"/>
+                        </a:rPr>
+                        <a:t>Ceramic tube insert</a:t>
+                      </a:r>
+                    </a:p>
+                  </a:txBody>
+                  <a:tcPr marL="7620" marR="7620" marT="7620" marB="0" anchor="b">
+                    <a:lnL w="12700" cap="flat" cmpd="sng" algn="ctr">
+                      <a:solidFill>
+                        <a:srgbClr val="000000"/>
+                      </a:solidFill>
+                      <a:prstDash val="solid"/>
+                      <a:round/>
+                      <a:headEnd type="none" w="med" len="med"/>
+                      <a:tailEnd type="none" w="med" len="med"/>
+                    </a:lnL>
+                    <a:lnR w="6350" cap="flat" cmpd="sng" algn="ctr">
+                      <a:solidFill>
+                        <a:srgbClr val="000000"/>
+                      </a:solidFill>
+                      <a:prstDash val="solid"/>
+                      <a:round/>
+                      <a:headEnd type="none" w="med" len="med"/>
+                      <a:tailEnd type="none" w="med" len="med"/>
+                    </a:lnR>
+                    <a:lnT w="6350" cap="flat" cmpd="sng" algn="ctr">
+                      <a:solidFill>
+                        <a:srgbClr val="000000"/>
+                      </a:solidFill>
+                      <a:prstDash val="solid"/>
+                      <a:round/>
+                      <a:headEnd type="none" w="med" len="med"/>
+                      <a:tailEnd type="none" w="med" len="med"/>
+                    </a:lnT>
+                    <a:lnB w="6350" cap="flat" cmpd="sng" algn="ctr">
+                      <a:solidFill>
+                        <a:srgbClr val="000000"/>
+                      </a:solidFill>
+                      <a:prstDash val="solid"/>
+                      <a:round/>
+                      <a:headEnd type="none" w="med" len="med"/>
+                      <a:tailEnd type="none" w="med" len="med"/>
+                    </a:lnB>
+                  </a:tcPr>
+                </a:tc>
+                <a:tc>
+                  <a:txBody>
+                    <a:bodyPr/>
+                    <a:lstStyle/>
+                    <a:p>
+                      <a:pPr algn="r" fontAlgn="b"/>
+                      <a:r>
+                        <a:rPr lang="en-US" sz="1400" b="0" i="0" u="none" strike="noStrike">
+                          <a:solidFill>
+                            <a:srgbClr val="000000"/>
+                          </a:solidFill>
+                          <a:effectLst/>
+                          <a:latin typeface="Calibri"/>
+                        </a:rPr>
+                        <a:t>$100</a:t>
+                      </a:r>
+                    </a:p>
+                  </a:txBody>
+                  <a:tcPr marL="7620" marR="7620" marT="7620" marB="0" anchor="b">
+                    <a:lnL w="6350" cap="flat" cmpd="sng" algn="ctr">
+                      <a:solidFill>
+                        <a:srgbClr val="000000"/>
+                      </a:solidFill>
+                      <a:prstDash val="solid"/>
+                      <a:round/>
+                      <a:headEnd type="none" w="med" len="med"/>
+                      <a:tailEnd type="none" w="med" len="med"/>
+                    </a:lnL>
+                    <a:lnR w="12700" cap="flat" cmpd="sng" algn="ctr">
+                      <a:solidFill>
+                        <a:srgbClr val="000000"/>
+                      </a:solidFill>
+                      <a:prstDash val="solid"/>
+                      <a:round/>
+                      <a:headEnd type="none" w="med" len="med"/>
+                      <a:tailEnd type="none" w="med" len="med"/>
+                    </a:lnR>
+                    <a:lnT w="6350" cap="flat" cmpd="sng" algn="ctr">
+                      <a:solidFill>
+                        <a:srgbClr val="000000"/>
+                      </a:solidFill>
+                      <a:prstDash val="solid"/>
+                      <a:round/>
+                      <a:headEnd type="none" w="med" len="med"/>
+                      <a:tailEnd type="none" w="med" len="med"/>
+                    </a:lnT>
+                    <a:lnB w="6350" cap="flat" cmpd="sng" algn="ctr">
+                      <a:solidFill>
+                        <a:srgbClr val="000000"/>
+                      </a:solidFill>
+                      <a:prstDash val="solid"/>
+                      <a:round/>
+                      <a:headEnd type="none" w="med" len="med"/>
+                      <a:tailEnd type="none" w="med" len="med"/>
+                    </a:lnB>
+                  </a:tcPr>
+                </a:tc>
+              </a:tr>
+              <a:tr h="207746">
+                <a:tc>
+                  <a:txBody>
+                    <a:bodyPr/>
+                    <a:lstStyle/>
+                    <a:p>
+                      <a:pPr algn="l" fontAlgn="b"/>
+                      <a:r>
+                        <a:rPr lang="en-US" sz="1400" b="0" i="0" u="none" strike="noStrike">
+                          <a:solidFill>
+                            <a:srgbClr val="000000"/>
+                          </a:solidFill>
+                          <a:effectLst/>
+                          <a:latin typeface="Calibri"/>
+                        </a:rPr>
+                        <a:t>Replacement damper &amp; actuator</a:t>
+                      </a:r>
+                    </a:p>
+                  </a:txBody>
+                  <a:tcPr marL="7620" marR="7620" marT="7620" marB="0" anchor="b">
+                    <a:lnL w="12700" cap="flat" cmpd="sng" algn="ctr">
+                      <a:solidFill>
+                        <a:srgbClr val="000000"/>
+                      </a:solidFill>
+                      <a:prstDash val="solid"/>
+                      <a:round/>
+                      <a:headEnd type="none" w="med" len="med"/>
+                      <a:tailEnd type="none" w="med" len="med"/>
+                    </a:lnL>
+                    <a:lnR w="6350" cap="flat" cmpd="sng" algn="ctr">
+                      <a:solidFill>
+                        <a:srgbClr val="000000"/>
+                      </a:solidFill>
+                      <a:prstDash val="solid"/>
+                      <a:round/>
+                      <a:headEnd type="none" w="med" len="med"/>
+                      <a:tailEnd type="none" w="med" len="med"/>
+                    </a:lnR>
+                    <a:lnT w="6350" cap="flat" cmpd="sng" algn="ctr">
+                      <a:solidFill>
+                        <a:srgbClr val="000000"/>
+                      </a:solidFill>
+                      <a:prstDash val="solid"/>
+                      <a:round/>
+                      <a:headEnd type="none" w="med" len="med"/>
+                      <a:tailEnd type="none" w="med" len="med"/>
+                    </a:lnT>
+                    <a:lnB w="6350" cap="flat" cmpd="sng" algn="ctr">
+                      <a:solidFill>
+                        <a:srgbClr val="000000"/>
+                      </a:solidFill>
+                      <a:prstDash val="solid"/>
+                      <a:round/>
+                      <a:headEnd type="none" w="med" len="med"/>
+                      <a:tailEnd type="none" w="med" len="med"/>
+                    </a:lnB>
+                  </a:tcPr>
+                </a:tc>
+                <a:tc>
+                  <a:txBody>
+                    <a:bodyPr/>
+                    <a:lstStyle/>
+                    <a:p>
+                      <a:pPr algn="r" fontAlgn="b"/>
+                      <a:r>
+                        <a:rPr lang="en-US" sz="1400" b="0" i="0" u="none" strike="noStrike">
+                          <a:solidFill>
+                            <a:srgbClr val="000000"/>
+                          </a:solidFill>
+                          <a:effectLst/>
+                          <a:latin typeface="Calibri"/>
+                        </a:rPr>
+                        <a:t>$400</a:t>
+                      </a:r>
+                    </a:p>
+                  </a:txBody>
+                  <a:tcPr marL="7620" marR="7620" marT="7620" marB="0" anchor="b">
+                    <a:lnL w="6350" cap="flat" cmpd="sng" algn="ctr">
+                      <a:solidFill>
+                        <a:srgbClr val="000000"/>
+                      </a:solidFill>
+                      <a:prstDash val="solid"/>
+                      <a:round/>
+                      <a:headEnd type="none" w="med" len="med"/>
+                      <a:tailEnd type="none" w="med" len="med"/>
+                    </a:lnL>
+                    <a:lnR w="12700" cap="flat" cmpd="sng" algn="ctr">
+                      <a:solidFill>
+                        <a:srgbClr val="000000"/>
+                      </a:solidFill>
+                      <a:prstDash val="solid"/>
+                      <a:round/>
+                      <a:headEnd type="none" w="med" len="med"/>
+                      <a:tailEnd type="none" w="med" len="med"/>
+                    </a:lnR>
+                    <a:lnT w="6350" cap="flat" cmpd="sng" algn="ctr">
+                      <a:solidFill>
+                        <a:srgbClr val="000000"/>
+                      </a:solidFill>
+                      <a:prstDash val="solid"/>
+                      <a:round/>
+                      <a:headEnd type="none" w="med" len="med"/>
+                      <a:tailEnd type="none" w="med" len="med"/>
+                    </a:lnT>
+                    <a:lnB w="6350" cap="flat" cmpd="sng" algn="ctr">
+                      <a:solidFill>
+                        <a:srgbClr val="000000"/>
+                      </a:solidFill>
+                      <a:prstDash val="solid"/>
+                      <a:round/>
+                      <a:headEnd type="none" w="med" len="med"/>
+                      <a:tailEnd type="none" w="med" len="med"/>
+                    </a:lnB>
+                  </a:tcPr>
+                </a:tc>
+              </a:tr>
+              <a:tr h="216401">
+                <a:tc>
+                  <a:txBody>
+                    <a:bodyPr/>
+                    <a:lstStyle/>
+                    <a:p>
+                      <a:pPr algn="l" fontAlgn="b"/>
+                      <a:r>
+                        <a:rPr lang="en-US" sz="1400" b="0" i="0" u="none" strike="noStrike">
+                          <a:solidFill>
+                            <a:srgbClr val="000000"/>
+                          </a:solidFill>
+                          <a:effectLst/>
+                          <a:latin typeface="Calibri"/>
+                        </a:rPr>
+                        <a:t>John Clause Labor</a:t>
+                      </a:r>
+                    </a:p>
+                  </a:txBody>
+                  <a:tcPr marL="7620" marR="7620" marT="7620" marB="0" anchor="b">
+                    <a:lnL w="12700" cap="flat" cmpd="sng" algn="ctr">
+                      <a:solidFill>
+                        <a:srgbClr val="000000"/>
+                      </a:solidFill>
+                      <a:prstDash val="solid"/>
+                      <a:round/>
+                      <a:headEnd type="none" w="med" len="med"/>
+                      <a:tailEnd type="none" w="med" len="med"/>
+                    </a:lnL>
+                    <a:lnR w="6350" cap="flat" cmpd="sng" algn="ctr">
+                      <a:solidFill>
+                        <a:srgbClr val="000000"/>
+                      </a:solidFill>
+                      <a:prstDash val="solid"/>
+                      <a:round/>
+                      <a:headEnd type="none" w="med" len="med"/>
+                      <a:tailEnd type="none" w="med" len="med"/>
+                    </a:lnR>
+                    <a:lnT w="6350" cap="flat" cmpd="sng" algn="ctr">
+                      <a:solidFill>
+                        <a:srgbClr val="000000"/>
+                      </a:solidFill>
+                      <a:prstDash val="solid"/>
+                      <a:round/>
+                      <a:headEnd type="none" w="med" len="med"/>
+                      <a:tailEnd type="none" w="med" len="med"/>
+                    </a:lnT>
+                    <a:lnB w="12700" cap="flat" cmpd="sng" algn="ctr">
+                      <a:solidFill>
+                        <a:srgbClr val="000000"/>
+                      </a:solidFill>
+                      <a:prstDash val="solid"/>
+                      <a:round/>
+                      <a:headEnd type="none" w="med" len="med"/>
+                      <a:tailEnd type="none" w="med" len="med"/>
+                    </a:lnB>
+                  </a:tcPr>
+                </a:tc>
+                <a:tc>
+                  <a:txBody>
+                    <a:bodyPr/>
+                    <a:lstStyle/>
+                    <a:p>
+                      <a:pPr algn="r" fontAlgn="b"/>
+                      <a:r>
+                        <a:rPr lang="en-US" sz="1400" b="0" i="0" u="none" strike="noStrike">
+                          <a:solidFill>
+                            <a:srgbClr val="000000"/>
+                          </a:solidFill>
+                          <a:effectLst/>
+                          <a:latin typeface="Calibri"/>
+                        </a:rPr>
+                        <a:t>$4,000</a:t>
+                      </a:r>
+                    </a:p>
+                  </a:txBody>
+                  <a:tcPr marL="7620" marR="7620" marT="7620" marB="0" anchor="b">
+                    <a:lnL w="6350" cap="flat" cmpd="sng" algn="ctr">
+                      <a:solidFill>
+                        <a:srgbClr val="000000"/>
+                      </a:solidFill>
+                      <a:prstDash val="solid"/>
+                      <a:round/>
+                      <a:headEnd type="none" w="med" len="med"/>
+                      <a:tailEnd type="none" w="med" len="med"/>
+                    </a:lnL>
+                    <a:lnR w="12700" cap="flat" cmpd="sng" algn="ctr">
+                      <a:solidFill>
+                        <a:srgbClr val="000000"/>
+                      </a:solidFill>
+                      <a:prstDash val="solid"/>
+                      <a:round/>
+                      <a:headEnd type="none" w="med" len="med"/>
+                      <a:tailEnd type="none" w="med" len="med"/>
+                    </a:lnR>
+                    <a:lnT w="6350" cap="flat" cmpd="sng" algn="ctr">
+                      <a:solidFill>
+                        <a:srgbClr val="000000"/>
+                      </a:solidFill>
+                      <a:prstDash val="solid"/>
+                      <a:round/>
+                      <a:headEnd type="none" w="med" len="med"/>
+                      <a:tailEnd type="none" w="med" len="med"/>
+                    </a:lnT>
+                    <a:lnB w="12700" cap="flat" cmpd="sng" algn="ctr">
+                      <a:solidFill>
+                        <a:srgbClr val="000000"/>
+                      </a:solidFill>
+                      <a:prstDash val="solid"/>
+                      <a:round/>
+                      <a:headEnd type="none" w="med" len="med"/>
+                      <a:tailEnd type="none" w="med" len="med"/>
+                    </a:lnB>
+                  </a:tcPr>
+                </a:tc>
+              </a:tr>
+              <a:tr h="216401">
+                <a:tc>
+                  <a:txBody>
+                    <a:bodyPr/>
+                    <a:lstStyle/>
+                    <a:p>
+                      <a:pPr algn="l" fontAlgn="b"/>
+                      <a:r>
+                        <a:rPr lang="en-US" sz="1400" b="1" i="0" u="none" strike="noStrike">
+                          <a:solidFill>
+                            <a:srgbClr val="000000"/>
+                          </a:solidFill>
+                          <a:effectLst/>
+                          <a:latin typeface="Calibri"/>
+                        </a:rPr>
+                        <a:t>Total</a:t>
+                      </a:r>
+                    </a:p>
+                  </a:txBody>
+                  <a:tcPr marL="7620" marR="7620" marT="7620" marB="0" anchor="b">
+                    <a:lnL w="12700" cap="flat" cmpd="sng" algn="ctr">
+                      <a:solidFill>
+                        <a:srgbClr val="000000"/>
+                      </a:solidFill>
+                      <a:prstDash val="solid"/>
+                      <a:round/>
+                      <a:headEnd type="none" w="med" len="med"/>
+                      <a:tailEnd type="none" w="med" len="med"/>
+                    </a:lnL>
+                    <a:lnR w="6350" cap="flat" cmpd="sng" algn="ctr">
+                      <a:solidFill>
+                        <a:srgbClr val="000000"/>
+                      </a:solidFill>
+                      <a:prstDash val="solid"/>
+                      <a:round/>
+                      <a:headEnd type="none" w="med" len="med"/>
+                      <a:tailEnd type="none" w="med" len="med"/>
+                    </a:lnR>
+                    <a:lnT w="12700" cap="flat" cmpd="sng" algn="ctr">
+                      <a:solidFill>
+                        <a:srgbClr val="000000"/>
+                      </a:solidFill>
+                      <a:prstDash val="solid"/>
+                      <a:round/>
+                      <a:headEnd type="none" w="med" len="med"/>
+                      <a:tailEnd type="none" w="med" len="med"/>
+                    </a:lnT>
+                    <a:lnB w="12700" cap="flat" cmpd="sng" algn="ctr">
+                      <a:solidFill>
+                        <a:srgbClr val="000000"/>
+                      </a:solidFill>
+                      <a:prstDash val="solid"/>
+                      <a:round/>
+                      <a:headEnd type="none" w="med" len="med"/>
+                      <a:tailEnd type="none" w="med" len="med"/>
+                    </a:lnB>
+                  </a:tcPr>
+                </a:tc>
+                <a:tc>
+                  <a:txBody>
+                    <a:bodyPr/>
+                    <a:lstStyle/>
+                    <a:p>
+                      <a:pPr algn="r" fontAlgn="b"/>
+                      <a:r>
+                        <a:rPr lang="en-US" sz="1400" b="1" i="0" u="none" strike="noStrike" dirty="0">
+                          <a:solidFill>
+                            <a:srgbClr val="000000"/>
+                          </a:solidFill>
+                          <a:effectLst/>
+                          <a:latin typeface="Calibri"/>
+                        </a:rPr>
+                        <a:t>$23,605</a:t>
+                      </a:r>
+                    </a:p>
+                  </a:txBody>
+                  <a:tcPr marL="7620" marR="7620" marT="7620" marB="0" anchor="b">
+                    <a:lnL w="6350" cap="flat" cmpd="sng" algn="ctr">
+                      <a:solidFill>
+                        <a:srgbClr val="000000"/>
+                      </a:solidFill>
+                      <a:prstDash val="solid"/>
+                      <a:round/>
+                      <a:headEnd type="none" w="med" len="med"/>
+                      <a:tailEnd type="none" w="med" len="med"/>
+                    </a:lnL>
+                    <a:lnR w="12700" cap="flat" cmpd="sng" algn="ctr">
+                      <a:solidFill>
+                        <a:srgbClr val="000000"/>
+                      </a:solidFill>
+                      <a:prstDash val="solid"/>
+                      <a:round/>
+                      <a:headEnd type="none" w="med" len="med"/>
+                      <a:tailEnd type="none" w="med" len="med"/>
+                    </a:lnR>
+                    <a:lnT w="12700" cap="flat" cmpd="sng" algn="ctr">
+                      <a:solidFill>
+                        <a:srgbClr val="000000"/>
+                      </a:solidFill>
+                      <a:prstDash val="solid"/>
+                      <a:round/>
+                      <a:headEnd type="none" w="med" len="med"/>
+                      <a:tailEnd type="none" w="med" len="med"/>
+                    </a:lnT>
+                    <a:lnB w="12700" cap="flat" cmpd="sng" algn="ctr">
+                      <a:solidFill>
+                        <a:srgbClr val="000000"/>
+                      </a:solidFill>
+                      <a:prstDash val="solid"/>
+                      <a:round/>
+                      <a:headEnd type="none" w="med" len="med"/>
+                      <a:tailEnd type="none" w="med" len="med"/>
+                    </a:lnB>
+                  </a:tcPr>
+                </a:tc>
+              </a:tr>
+            </a:tbl>
+          </a:graphicData>
+        </a:graphic>
+      </p:graphicFrame>
+    </p:spTree>
+    <p:extLst>
+      <p:ext uri="{BB962C8B-B14F-4D97-AF65-F5344CB8AC3E}">
+        <p14:creationId xmlns:p14="http://schemas.microsoft.com/office/powerpoint/2010/main" val="581484725"/>
+      </p:ext>
+    </p:extLst>
+  </p:cSld>
+  <p:clrMapOvr>
+    <a:masterClrMapping/>
+  </p:clrMapOvr>
+  <p:timing>
+    <p:tnLst>
+      <p:par>
+        <p:cTn id="1" dur="indefinite" restart="never" nodeType="tmRoot"/>
+      </p:par>
+    </p:tnLst>
+  </p:timing>
+</p:sld>
+</file>
+
+<file path=ppt/slides/slide7.xml><?xml version="1.0" encoding="utf-8"?>
+<p:sld xmlns:a="http://schemas.openxmlformats.org/drawingml/2006/main" xmlns:r="http://schemas.openxmlformats.org/officeDocument/2006/relationships" xmlns:p="http://schemas.openxmlformats.org/presentationml/2006/main">
+  <p:cSld>
+    <p:spTree>
+      <p:nvGrpSpPr>
+        <p:cNvPr id="1" name=""/>
+        <p:cNvGrpSpPr/>
+        <p:nvPr/>
+      </p:nvGrpSpPr>
+      <p:grpSpPr>
+        <a:xfrm>
+          <a:off x="0" y="0"/>
+          <a:ext cx="0" cy="0"/>
+          <a:chOff x="0" y="0"/>
+          <a:chExt cx="0" cy="0"/>
+        </a:xfrm>
+      </p:grpSpPr>
+      <p:sp>
+        <p:nvSpPr>
+          <p:cNvPr id="2" name="Title 1"/>
+          <p:cNvSpPr>
+            <a:spLocks noGrp="1"/>
+          </p:cNvSpPr>
+          <p:nvPr>
+            <p:ph type="title"/>
+          </p:nvPr>
+        </p:nvSpPr>
+        <p:spPr/>
+        <p:txBody>
+          <a:bodyPr/>
+          <a:lstStyle/>
+          <a:p>
+            <a:r>
+              <a:rPr lang="en-US" dirty="0" smtClean="0"/>
+              <a:t>Project Payback</a:t>
+            </a:r>
+            <a:endParaRPr lang="en-US" dirty="0"/>
+          </a:p>
+        </p:txBody>
+      </p:sp>
+      <p:sp>
+        <p:nvSpPr>
+          <p:cNvPr id="3" name="Content Placeholder 2"/>
+          <p:cNvSpPr>
+            <a:spLocks noGrp="1"/>
+          </p:cNvSpPr>
+          <p:nvPr>
+            <p:ph idx="1"/>
+          </p:nvPr>
+        </p:nvSpPr>
+        <p:spPr/>
+        <p:txBody>
+          <a:bodyPr/>
+          <a:lstStyle/>
+          <a:p>
+            <a:endParaRPr lang="en-US" dirty="0"/>
+          </a:p>
+        </p:txBody>
+      </p:sp>
+    </p:spTree>
+    <p:extLst>
+      <p:ext uri="{BB962C8B-B14F-4D97-AF65-F5344CB8AC3E}">
+        <p14:creationId xmlns:p14="http://schemas.microsoft.com/office/powerpoint/2010/main" val="786188270"/>
+      </p:ext>
+    </p:extLst>
+  </p:cSld>
+  <p:clrMapOvr>
+    <a:masterClrMapping/>
+  </p:clrMapOvr>
+  <p:timing>
+    <p:tnLst>
+      <p:par>
+        <p:cTn id="1" dur="indefinite" restart="never" nodeType="tmRoot"/>
+      </p:par>
+    </p:tnLst>
+  </p:timing>
+</p:sld>
+</file>
+
+<file path=ppt/slides/slide8.xml><?xml version="1.0" encoding="utf-8"?>
+<p:sld xmlns:a="http://schemas.openxmlformats.org/drawingml/2006/main" xmlns:r="http://schemas.openxmlformats.org/officeDocument/2006/relationships" xmlns:p="http://schemas.openxmlformats.org/presentationml/2006/main">
+  <p:cSld>
+    <p:spTree>
+      <p:nvGrpSpPr>
+        <p:cNvPr id="1" name=""/>
+        <p:cNvGrpSpPr/>
+        <p:nvPr/>
+      </p:nvGrpSpPr>
+      <p:grpSpPr>
+        <a:xfrm>
+          <a:off x="0" y="0"/>
+          <a:ext cx="0" cy="0"/>
+          <a:chOff x="0" y="0"/>
+          <a:chExt cx="0" cy="0"/>
+        </a:xfrm>
+      </p:grpSpPr>
+      <p:sp>
+        <p:nvSpPr>
+          <p:cNvPr id="2" name="Title 1"/>
+          <p:cNvSpPr>
+            <a:spLocks noGrp="1"/>
+          </p:cNvSpPr>
+          <p:nvPr>
+            <p:ph type="title"/>
+          </p:nvPr>
+        </p:nvSpPr>
+        <p:spPr/>
+        <p:txBody>
+          <a:bodyPr/>
+          <a:lstStyle/>
+          <a:p>
+            <a:r>
+              <a:rPr lang="en-US" dirty="0" smtClean="0"/>
+              <a:t>Project Risks</a:t>
+            </a:r>
+            <a:endParaRPr lang="en-US" dirty="0"/>
+          </a:p>
+        </p:txBody>
+      </p:sp>
+      <p:graphicFrame>
+        <p:nvGraphicFramePr>
+          <p:cNvPr id="5" name="Content Placeholder 4"/>
+          <p:cNvGraphicFramePr>
+            <a:graphicFrameLocks noGrp="1"/>
+          </p:cNvGraphicFramePr>
+          <p:nvPr>
+            <p:ph idx="1"/>
+            <p:extLst>
+              <p:ext uri="{D42A27DB-BD31-4B8C-83A1-F6EECF244321}">
+                <p14:modId xmlns:p14="http://schemas.microsoft.com/office/powerpoint/2010/main" val="4067819240"/>
+              </p:ext>
+            </p:extLst>
+          </p:nvPr>
+        </p:nvGraphicFramePr>
+        <p:xfrm>
+          <a:off x="1295400" y="2468561"/>
+          <a:ext cx="6553200" cy="3170239"/>
+        </p:xfrm>
+        <a:graphic>
+          <a:graphicData uri="http://schemas.openxmlformats.org/drawingml/2006/table">
+            <a:tbl>
+              <a:tblPr/>
+              <a:tblGrid>
+                <a:gridCol w="2695618"/>
+                <a:gridCol w="3857582"/>
+              </a:tblGrid>
+              <a:tr h="264187">
+                <a:tc>
+                  <a:txBody>
+                    <a:bodyPr/>
+                    <a:lstStyle/>
+                    <a:p>
+                      <a:pPr algn="l" fontAlgn="b"/>
+                      <a:r>
+                        <a:rPr lang="en-US" sz="1400" b="1" i="0" u="none" strike="noStrike" dirty="0">
+                          <a:solidFill>
+                            <a:srgbClr val="000000"/>
+                          </a:solidFill>
+                          <a:effectLst/>
+                          <a:latin typeface="Calibri"/>
+                        </a:rPr>
+                        <a:t>Project Risks</a:t>
+                      </a:r>
+                    </a:p>
+                  </a:txBody>
+                  <a:tcPr marL="7620" marR="7620" marT="7620" marB="0" anchor="b">
+                    <a:lnL w="12700" cap="flat" cmpd="sng" algn="ctr">
+                      <a:solidFill>
+                        <a:srgbClr val="000000"/>
+                      </a:solidFill>
+                      <a:prstDash val="solid"/>
+                      <a:round/>
+                      <a:headEnd type="none" w="med" len="med"/>
+                      <a:tailEnd type="none" w="med" len="med"/>
+                    </a:lnL>
+                    <a:lnR w="6350" cap="flat" cmpd="sng" algn="ctr">
+                      <a:solidFill>
+                        <a:srgbClr val="000000"/>
+                      </a:solidFill>
+                      <a:prstDash val="solid"/>
+                      <a:round/>
+                      <a:headEnd type="none" w="med" len="med"/>
+                      <a:tailEnd type="none" w="med" len="med"/>
+                    </a:lnR>
+                    <a:lnT w="12700" cap="flat" cmpd="sng" algn="ctr">
+                      <a:solidFill>
+                        <a:srgbClr val="000000"/>
+                      </a:solidFill>
+                      <a:prstDash val="solid"/>
+                      <a:round/>
+                      <a:headEnd type="none" w="med" len="med"/>
+                      <a:tailEnd type="none" w="med" len="med"/>
+                    </a:lnT>
+                    <a:lnB w="12700" cap="flat" cmpd="sng" algn="ctr">
+                      <a:solidFill>
+                        <a:srgbClr val="000000"/>
+                      </a:solidFill>
+                      <a:prstDash val="solid"/>
+                      <a:round/>
+                      <a:headEnd type="none" w="med" len="med"/>
+                      <a:tailEnd type="none" w="med" len="med"/>
+                    </a:lnB>
+                  </a:tcPr>
+                </a:tc>
+                <a:tc>
+                  <a:txBody>
+                    <a:bodyPr/>
+                    <a:lstStyle/>
+                    <a:p>
+                      <a:pPr algn="l" fontAlgn="b"/>
+                      <a:r>
+                        <a:rPr lang="en-US" sz="1400" b="1" i="0" u="none" strike="noStrike">
+                          <a:solidFill>
+                            <a:srgbClr val="000000"/>
+                          </a:solidFill>
+                          <a:effectLst/>
+                          <a:latin typeface="Calibri"/>
+                        </a:rPr>
+                        <a:t>Response</a:t>
+                      </a:r>
+                    </a:p>
+                  </a:txBody>
+                  <a:tcPr marL="7620" marR="7620" marT="7620" marB="0" anchor="b">
+                    <a:lnL w="6350" cap="flat" cmpd="sng" algn="ctr">
+                      <a:solidFill>
+                        <a:srgbClr val="000000"/>
+                      </a:solidFill>
+                      <a:prstDash val="solid"/>
+                      <a:round/>
+                      <a:headEnd type="none" w="med" len="med"/>
+                      <a:tailEnd type="none" w="med" len="med"/>
+                    </a:lnL>
+                    <a:lnR w="12700" cap="flat" cmpd="sng" algn="ctr">
+                      <a:solidFill>
+                        <a:srgbClr val="000000"/>
+                      </a:solidFill>
+                      <a:prstDash val="solid"/>
+                      <a:round/>
+                      <a:headEnd type="none" w="med" len="med"/>
+                      <a:tailEnd type="none" w="med" len="med"/>
+                    </a:lnR>
+                    <a:lnT w="12700" cap="flat" cmpd="sng" algn="ctr">
+                      <a:solidFill>
+                        <a:srgbClr val="000000"/>
+                      </a:solidFill>
+                      <a:prstDash val="solid"/>
+                      <a:round/>
+                      <a:headEnd type="none" w="med" len="med"/>
+                      <a:tailEnd type="none" w="med" len="med"/>
+                    </a:lnT>
+                    <a:lnB w="12700" cap="flat" cmpd="sng" algn="ctr">
+                      <a:solidFill>
+                        <a:srgbClr val="000000"/>
+                      </a:solidFill>
+                      <a:prstDash val="solid"/>
+                      <a:round/>
+                      <a:headEnd type="none" w="med" len="med"/>
+                      <a:tailEnd type="none" w="med" len="med"/>
+                    </a:lnB>
+                  </a:tcPr>
+                </a:tc>
+              </a:tr>
+              <a:tr h="708020">
+                <a:tc>
+                  <a:txBody>
+                    <a:bodyPr/>
+                    <a:lstStyle/>
+                    <a:p>
+                      <a:pPr algn="l" fontAlgn="ctr"/>
+                      <a:r>
+                        <a:rPr lang="en-US" sz="1400" b="0" i="0" u="none" strike="noStrike">
+                          <a:solidFill>
+                            <a:srgbClr val="000000"/>
+                          </a:solidFill>
+                          <a:effectLst/>
+                          <a:latin typeface="Calibri"/>
+                        </a:rPr>
+                        <a:t>Controller Setup Improperly</a:t>
+                      </a:r>
+                    </a:p>
+                  </a:txBody>
+                  <a:tcPr marL="7620" marR="7620" marT="7620" marB="0" anchor="ctr">
+                    <a:lnL w="12700" cap="flat" cmpd="sng" algn="ctr">
+                      <a:solidFill>
+                        <a:srgbClr val="000000"/>
+                      </a:solidFill>
+                      <a:prstDash val="solid"/>
+                      <a:round/>
+                      <a:headEnd type="none" w="med" len="med"/>
+                      <a:tailEnd type="none" w="med" len="med"/>
+                    </a:lnL>
+                    <a:lnR w="6350" cap="flat" cmpd="sng" algn="ctr">
+                      <a:solidFill>
+                        <a:srgbClr val="000000"/>
+                      </a:solidFill>
+                      <a:prstDash val="solid"/>
+                      <a:round/>
+                      <a:headEnd type="none" w="med" len="med"/>
+                      <a:tailEnd type="none" w="med" len="med"/>
+                    </a:lnR>
+                    <a:lnT w="12700" cap="flat" cmpd="sng" algn="ctr">
+                      <a:solidFill>
+                        <a:srgbClr val="000000"/>
+                      </a:solidFill>
+                      <a:prstDash val="solid"/>
+                      <a:round/>
+                      <a:headEnd type="none" w="med" len="med"/>
+                      <a:tailEnd type="none" w="med" len="med"/>
+                    </a:lnT>
+                    <a:lnB w="6350" cap="flat" cmpd="sng" algn="ctr">
+                      <a:solidFill>
+                        <a:srgbClr val="000000"/>
+                      </a:solidFill>
+                      <a:prstDash val="solid"/>
+                      <a:round/>
+                      <a:headEnd type="none" w="med" len="med"/>
+                      <a:tailEnd type="none" w="med" len="med"/>
+                    </a:lnB>
+                  </a:tcPr>
+                </a:tc>
+                <a:tc>
+                  <a:txBody>
+                    <a:bodyPr/>
+                    <a:lstStyle/>
+                    <a:p>
+                      <a:pPr algn="l" fontAlgn="b"/>
+                      <a:r>
+                        <a:rPr lang="en-US" sz="1400" b="0" i="0" u="none" strike="noStrike">
+                          <a:solidFill>
+                            <a:srgbClr val="000000"/>
+                          </a:solidFill>
+                          <a:effectLst/>
+                          <a:latin typeface="Calibri"/>
+                        </a:rPr>
+                        <a:t>Work closely with John Clause to ensure proper implementation. Confer with Tim Hastings as back-up check.</a:t>
+                      </a:r>
+                    </a:p>
+                  </a:txBody>
+                  <a:tcPr marL="7620" marR="7620" marT="7620" marB="0" anchor="b">
+                    <a:lnL w="6350" cap="flat" cmpd="sng" algn="ctr">
+                      <a:solidFill>
+                        <a:srgbClr val="000000"/>
+                      </a:solidFill>
+                      <a:prstDash val="solid"/>
+                      <a:round/>
+                      <a:headEnd type="none" w="med" len="med"/>
+                      <a:tailEnd type="none" w="med" len="med"/>
+                    </a:lnL>
+                    <a:lnR w="12700" cap="flat" cmpd="sng" algn="ctr">
+                      <a:solidFill>
+                        <a:srgbClr val="000000"/>
+                      </a:solidFill>
+                      <a:prstDash val="solid"/>
+                      <a:round/>
+                      <a:headEnd type="none" w="med" len="med"/>
+                      <a:tailEnd type="none" w="med" len="med"/>
+                    </a:lnR>
+                    <a:lnT w="12700" cap="flat" cmpd="sng" algn="ctr">
+                      <a:solidFill>
+                        <a:srgbClr val="000000"/>
+                      </a:solidFill>
+                      <a:prstDash val="solid"/>
+                      <a:round/>
+                      <a:headEnd type="none" w="med" len="med"/>
+                      <a:tailEnd type="none" w="med" len="med"/>
+                    </a:lnT>
+                    <a:lnB w="6350" cap="flat" cmpd="sng" algn="ctr">
+                      <a:solidFill>
+                        <a:srgbClr val="000000"/>
+                      </a:solidFill>
+                      <a:prstDash val="solid"/>
+                      <a:round/>
+                      <a:headEnd type="none" w="med" len="med"/>
+                      <a:tailEnd type="none" w="med" len="med"/>
+                    </a:lnB>
+                  </a:tcPr>
+                </a:tc>
+              </a:tr>
+              <a:tr h="940504">
+                <a:tc>
+                  <a:txBody>
+                    <a:bodyPr/>
+                    <a:lstStyle/>
+                    <a:p>
+                      <a:pPr algn="l" fontAlgn="ctr"/>
+                      <a:r>
+                        <a:rPr lang="en-US" sz="1400" b="0" i="0" u="none" strike="noStrike">
+                          <a:solidFill>
+                            <a:srgbClr val="000000"/>
+                          </a:solidFill>
+                          <a:effectLst/>
+                          <a:latin typeface="Calibri"/>
+                        </a:rPr>
+                        <a:t>Negative Impact on Production</a:t>
+                      </a:r>
+                    </a:p>
+                  </a:txBody>
+                  <a:tcPr marL="7620" marR="7620" marT="7620" marB="0" anchor="ctr">
+                    <a:lnL w="12700" cap="flat" cmpd="sng" algn="ctr">
+                      <a:solidFill>
+                        <a:srgbClr val="000000"/>
+                      </a:solidFill>
+                      <a:prstDash val="solid"/>
+                      <a:round/>
+                      <a:headEnd type="none" w="med" len="med"/>
+                      <a:tailEnd type="none" w="med" len="med"/>
+                    </a:lnL>
+                    <a:lnR w="6350" cap="flat" cmpd="sng" algn="ctr">
+                      <a:solidFill>
+                        <a:srgbClr val="000000"/>
+                      </a:solidFill>
+                      <a:prstDash val="solid"/>
+                      <a:round/>
+                      <a:headEnd type="none" w="med" len="med"/>
+                      <a:tailEnd type="none" w="med" len="med"/>
+                    </a:lnR>
+                    <a:lnT w="6350" cap="flat" cmpd="sng" algn="ctr">
+                      <a:solidFill>
+                        <a:srgbClr val="000000"/>
+                      </a:solidFill>
+                      <a:prstDash val="solid"/>
+                      <a:round/>
+                      <a:headEnd type="none" w="med" len="med"/>
+                      <a:tailEnd type="none" w="med" len="med"/>
+                    </a:lnT>
+                    <a:lnB w="6350" cap="flat" cmpd="sng" algn="ctr">
+                      <a:solidFill>
+                        <a:srgbClr val="000000"/>
+                      </a:solidFill>
+                      <a:prstDash val="solid"/>
+                      <a:round/>
+                      <a:headEnd type="none" w="med" len="med"/>
+                      <a:tailEnd type="none" w="med" len="med"/>
+                    </a:lnB>
+                  </a:tcPr>
+                </a:tc>
+                <a:tc>
+                  <a:txBody>
+                    <a:bodyPr/>
+                    <a:lstStyle/>
+                    <a:p>
+                      <a:pPr algn="l" fontAlgn="b"/>
+                      <a:r>
+                        <a:rPr lang="en-US" sz="1400" b="0" i="0" u="none" strike="noStrike" dirty="0">
+                          <a:solidFill>
+                            <a:srgbClr val="000000"/>
+                          </a:solidFill>
+                          <a:effectLst/>
+                          <a:latin typeface="Calibri"/>
+                        </a:rPr>
+                        <a:t>Almost impossible, as we are manually managing process control now (poorly.) Worst case is controller failure after </a:t>
+                      </a:r>
+                      <a:r>
+                        <a:rPr lang="en-US" sz="1400" b="0" i="0" u="none" strike="noStrike" dirty="0" err="1">
+                          <a:solidFill>
+                            <a:srgbClr val="000000"/>
+                          </a:solidFill>
+                          <a:effectLst/>
+                          <a:latin typeface="Calibri"/>
+                        </a:rPr>
+                        <a:t>comissioning</a:t>
+                      </a:r>
+                      <a:r>
+                        <a:rPr lang="en-US" sz="1400" b="0" i="0" u="none" strike="noStrike" dirty="0">
+                          <a:solidFill>
+                            <a:srgbClr val="000000"/>
+                          </a:solidFill>
+                          <a:effectLst/>
+                          <a:latin typeface="Calibri"/>
+                        </a:rPr>
+                        <a:t>. In this worst case, we can always go back to manual control.</a:t>
+                      </a:r>
+                    </a:p>
+                  </a:txBody>
+                  <a:tcPr marL="7620" marR="7620" marT="7620" marB="0" anchor="b">
+                    <a:lnL w="6350" cap="flat" cmpd="sng" algn="ctr">
+                      <a:solidFill>
+                        <a:srgbClr val="000000"/>
+                      </a:solidFill>
+                      <a:prstDash val="solid"/>
+                      <a:round/>
+                      <a:headEnd type="none" w="med" len="med"/>
+                      <a:tailEnd type="none" w="med" len="med"/>
+                    </a:lnL>
+                    <a:lnR w="12700" cap="flat" cmpd="sng" algn="ctr">
+                      <a:solidFill>
+                        <a:srgbClr val="000000"/>
+                      </a:solidFill>
+                      <a:prstDash val="solid"/>
+                      <a:round/>
+                      <a:headEnd type="none" w="med" len="med"/>
+                      <a:tailEnd type="none" w="med" len="med"/>
+                    </a:lnR>
+                    <a:lnT w="6350" cap="flat" cmpd="sng" algn="ctr">
+                      <a:solidFill>
+                        <a:srgbClr val="000000"/>
+                      </a:solidFill>
+                      <a:prstDash val="solid"/>
+                      <a:round/>
+                      <a:headEnd type="none" w="med" len="med"/>
+                      <a:tailEnd type="none" w="med" len="med"/>
+                    </a:lnT>
+                    <a:lnB w="6350" cap="flat" cmpd="sng" algn="ctr">
+                      <a:solidFill>
+                        <a:srgbClr val="000000"/>
+                      </a:solidFill>
+                      <a:prstDash val="solid"/>
+                      <a:round/>
+                      <a:headEnd type="none" w="med" len="med"/>
+                      <a:tailEnd type="none" w="med" len="med"/>
+                    </a:lnB>
+                  </a:tcPr>
+                </a:tc>
+              </a:tr>
+              <a:tr h="507238">
+                <a:tc>
+                  <a:txBody>
+                    <a:bodyPr/>
+                    <a:lstStyle/>
+                    <a:p>
+                      <a:pPr algn="l" fontAlgn="ctr"/>
+                      <a:r>
+                        <a:rPr lang="en-US" sz="1400" b="0" i="0" u="none" strike="noStrike">
+                          <a:solidFill>
+                            <a:srgbClr val="000000"/>
+                          </a:solidFill>
+                          <a:effectLst/>
+                          <a:latin typeface="Calibri"/>
+                        </a:rPr>
+                        <a:t>Delay of Project Implementation due to maintenance unavailability</a:t>
+                      </a:r>
+                    </a:p>
+                  </a:txBody>
+                  <a:tcPr marL="7620" marR="7620" marT="7620" marB="0" anchor="ctr">
+                    <a:lnL w="12700" cap="flat" cmpd="sng" algn="ctr">
+                      <a:solidFill>
+                        <a:srgbClr val="000000"/>
+                      </a:solidFill>
+                      <a:prstDash val="solid"/>
+                      <a:round/>
+                      <a:headEnd type="none" w="med" len="med"/>
+                      <a:tailEnd type="none" w="med" len="med"/>
+                    </a:lnL>
+                    <a:lnR w="6350" cap="flat" cmpd="sng" algn="ctr">
+                      <a:solidFill>
+                        <a:srgbClr val="000000"/>
+                      </a:solidFill>
+                      <a:prstDash val="solid"/>
+                      <a:round/>
+                      <a:headEnd type="none" w="med" len="med"/>
+                      <a:tailEnd type="none" w="med" len="med"/>
+                    </a:lnR>
+                    <a:lnT w="6350" cap="flat" cmpd="sng" algn="ctr">
+                      <a:solidFill>
+                        <a:srgbClr val="000000"/>
+                      </a:solidFill>
+                      <a:prstDash val="solid"/>
+                      <a:round/>
+                      <a:headEnd type="none" w="med" len="med"/>
+                      <a:tailEnd type="none" w="med" len="med"/>
+                    </a:lnT>
+                    <a:lnB w="6350" cap="flat" cmpd="sng" algn="ctr">
+                      <a:solidFill>
+                        <a:srgbClr val="000000"/>
+                      </a:solidFill>
+                      <a:prstDash val="solid"/>
+                      <a:round/>
+                      <a:headEnd type="none" w="med" len="med"/>
+                      <a:tailEnd type="none" w="med" len="med"/>
+                    </a:lnB>
+                  </a:tcPr>
+                </a:tc>
+                <a:tc>
+                  <a:txBody>
+                    <a:bodyPr/>
+                    <a:lstStyle/>
+                    <a:p>
+                      <a:pPr algn="l" fontAlgn="b"/>
+                      <a:r>
+                        <a:rPr lang="en-US" sz="1400" b="0" i="0" u="none" strike="noStrike">
+                          <a:solidFill>
+                            <a:srgbClr val="000000"/>
+                          </a:solidFill>
+                          <a:effectLst/>
+                          <a:latin typeface="Calibri"/>
+                        </a:rPr>
+                        <a:t>Option to outsource electrical work. Will add cost to the project. Alternatively, accept delays</a:t>
+                      </a:r>
+                    </a:p>
+                  </a:txBody>
+                  <a:tcPr marL="7620" marR="7620" marT="7620" marB="0" anchor="b">
+                    <a:lnL w="6350" cap="flat" cmpd="sng" algn="ctr">
+                      <a:solidFill>
+                        <a:srgbClr val="000000"/>
+                      </a:solidFill>
+                      <a:prstDash val="solid"/>
+                      <a:round/>
+                      <a:headEnd type="none" w="med" len="med"/>
+                      <a:tailEnd type="none" w="med" len="med"/>
+                    </a:lnL>
+                    <a:lnR w="12700" cap="flat" cmpd="sng" algn="ctr">
+                      <a:solidFill>
+                        <a:srgbClr val="000000"/>
+                      </a:solidFill>
+                      <a:prstDash val="solid"/>
+                      <a:round/>
+                      <a:headEnd type="none" w="med" len="med"/>
+                      <a:tailEnd type="none" w="med" len="med"/>
+                    </a:lnR>
+                    <a:lnT w="6350" cap="flat" cmpd="sng" algn="ctr">
+                      <a:solidFill>
+                        <a:srgbClr val="000000"/>
+                      </a:solidFill>
+                      <a:prstDash val="solid"/>
+                      <a:round/>
+                      <a:headEnd type="none" w="med" len="med"/>
+                      <a:tailEnd type="none" w="med" len="med"/>
+                    </a:lnT>
+                    <a:lnB w="6350" cap="flat" cmpd="sng" algn="ctr">
+                      <a:solidFill>
+                        <a:srgbClr val="000000"/>
+                      </a:solidFill>
+                      <a:prstDash val="solid"/>
+                      <a:round/>
+                      <a:headEnd type="none" w="med" len="med"/>
+                      <a:tailEnd type="none" w="med" len="med"/>
+                    </a:lnB>
+                  </a:tcPr>
+                </a:tc>
+              </a:tr>
+              <a:tr h="750290">
+                <a:tc>
+                  <a:txBody>
+                    <a:bodyPr/>
+                    <a:lstStyle/>
+                    <a:p>
+                      <a:pPr algn="l" fontAlgn="ctr"/>
+                      <a:r>
+                        <a:rPr lang="en-US" sz="1400" b="0" i="0" u="none" strike="noStrike">
+                          <a:solidFill>
+                            <a:srgbClr val="000000"/>
+                          </a:solidFill>
+                          <a:effectLst/>
+                          <a:latin typeface="Calibri"/>
+                        </a:rPr>
+                        <a:t>Delay of Project due to production not running</a:t>
+                      </a:r>
+                    </a:p>
+                  </a:txBody>
+                  <a:tcPr marL="7620" marR="7620" marT="7620" marB="0" anchor="ctr">
+                    <a:lnL w="12700" cap="flat" cmpd="sng" algn="ctr">
+                      <a:solidFill>
+                        <a:srgbClr val="000000"/>
+                      </a:solidFill>
+                      <a:prstDash val="solid"/>
+                      <a:round/>
+                      <a:headEnd type="none" w="med" len="med"/>
+                      <a:tailEnd type="none" w="med" len="med"/>
+                    </a:lnL>
+                    <a:lnR w="6350" cap="flat" cmpd="sng" algn="ctr">
+                      <a:solidFill>
+                        <a:srgbClr val="000000"/>
+                      </a:solidFill>
+                      <a:prstDash val="solid"/>
+                      <a:round/>
+                      <a:headEnd type="none" w="med" len="med"/>
+                      <a:tailEnd type="none" w="med" len="med"/>
+                    </a:lnR>
+                    <a:lnT w="6350" cap="flat" cmpd="sng" algn="ctr">
+                      <a:solidFill>
+                        <a:srgbClr val="000000"/>
+                      </a:solidFill>
+                      <a:prstDash val="solid"/>
+                      <a:round/>
+                      <a:headEnd type="none" w="med" len="med"/>
+                      <a:tailEnd type="none" w="med" len="med"/>
+                    </a:lnT>
+                    <a:lnB w="12700" cap="flat" cmpd="sng" algn="ctr">
+                      <a:solidFill>
+                        <a:srgbClr val="000000"/>
+                      </a:solidFill>
+                      <a:prstDash val="solid"/>
+                      <a:round/>
+                      <a:headEnd type="none" w="med" len="med"/>
+                      <a:tailEnd type="none" w="med" len="med"/>
+                    </a:lnB>
+                  </a:tcPr>
+                </a:tc>
+                <a:tc>
+                  <a:txBody>
+                    <a:bodyPr/>
+                    <a:lstStyle/>
+                    <a:p>
+                      <a:pPr algn="l" fontAlgn="b"/>
+                      <a:r>
+                        <a:rPr lang="en-US" sz="1400" b="0" i="0" u="none" strike="noStrike" dirty="0">
+                          <a:solidFill>
+                            <a:srgbClr val="000000"/>
+                          </a:solidFill>
+                          <a:effectLst/>
+                          <a:latin typeface="Calibri"/>
+                        </a:rPr>
+                        <a:t>This is a reality we must accept. Will work with Chandra to give input on best times to run for project, but ultimately production comes first.</a:t>
+                      </a:r>
+                    </a:p>
+                  </a:txBody>
+                  <a:tcPr marL="7620" marR="7620" marT="7620" marB="0" anchor="b">
+                    <a:lnL w="6350" cap="flat" cmpd="sng" algn="ctr">
+                      <a:solidFill>
+                        <a:srgbClr val="000000"/>
+                      </a:solidFill>
+                      <a:prstDash val="solid"/>
+                      <a:round/>
+                      <a:headEnd type="none" w="med" len="med"/>
+                      <a:tailEnd type="none" w="med" len="med"/>
+                    </a:lnL>
+                    <a:lnR w="12700" cap="flat" cmpd="sng" algn="ctr">
+                      <a:solidFill>
+                        <a:srgbClr val="000000"/>
+                      </a:solidFill>
+                      <a:prstDash val="solid"/>
+                      <a:round/>
+                      <a:headEnd type="none" w="med" len="med"/>
+                      <a:tailEnd type="none" w="med" len="med"/>
+                    </a:lnR>
+                    <a:lnT w="6350" cap="flat" cmpd="sng" algn="ctr">
+                      <a:solidFill>
+                        <a:srgbClr val="000000"/>
+                      </a:solidFill>
+                      <a:prstDash val="solid"/>
+                      <a:round/>
+                      <a:headEnd type="none" w="med" len="med"/>
+                      <a:tailEnd type="none" w="med" len="med"/>
+                    </a:lnT>
+                    <a:lnB w="12700" cap="flat" cmpd="sng" algn="ctr">
+                      <a:solidFill>
+                        <a:srgbClr val="000000"/>
+                      </a:solidFill>
+                      <a:prstDash val="solid"/>
+                      <a:round/>
+                      <a:headEnd type="none" w="med" len="med"/>
+                      <a:tailEnd type="none" w="med" len="med"/>
+                    </a:lnB>
+                  </a:tcPr>
+                </a:tc>
+              </a:tr>
+            </a:tbl>
+          </a:graphicData>
+        </a:graphic>
+      </p:graphicFrame>
+    </p:spTree>
+    <p:extLst>
+      <p:ext uri="{BB962C8B-B14F-4D97-AF65-F5344CB8AC3E}">
+        <p14:creationId xmlns:p14="http://schemas.microsoft.com/office/powerpoint/2010/main" val="3895354164"/>
       </p:ext>
     </p:extLst>
   </p:cSld>

</xml_diff>